<commit_message>
Recent notes on for editing transactional objects
</commit_message>
<xml_diff>
--- a/products/tesseract/Persisted object commits.pptx
+++ b/products/tesseract/Persisted object commits.pptx
@@ -7,9 +7,10 @@
   <p:sldIdLst>
     <p:sldId id="256" r:id="rId5"/>
     <p:sldId id="257" r:id="rId6"/>
+    <p:sldId id="259" r:id="rId7"/>
   </p:sldIdLst>
   <p:sldSz cx="12192000" cy="6858000"/>
-  <p:notesSz cx="6858000" cy="9144000"/>
+  <p:notesSz cx="7077075" cy="9363075"/>
   <p:defaultTextStyle>
     <a:defPPr>
       <a:defRPr lang="en-US"/>
@@ -105,6 +106,11 @@
       </a:defRPr>
     </a:lvl9pPr>
   </p:defaultTextStyle>
+  <p:extLst>
+    <p:ext uri="{EFAFB233-063F-42B5-8137-9DF3F51BA10A}">
+      <p15:sldGuideLst xmlns:p15="http://schemas.microsoft.com/office/powerpoint/2012/main"/>
+    </p:ext>
+  </p:extLst>
 </p:presentation>
 </file>
 
@@ -485,7 +491,7 @@
           <a:p>
             <a:fld id="{72AD840A-AB2C-4C90-8C87-D662D6BC1416}" type="datetimeFigureOut">
               <a:rPr lang="en-GB" smtClean="0"/>
-              <a:t>19/05/2020</a:t>
+              <a:t>25/02/2021</a:t>
             </a:fld>
             <a:endParaRPr lang="en-GB"/>
           </a:p>
@@ -685,7 +691,7 @@
           <a:p>
             <a:fld id="{72AD840A-AB2C-4C90-8C87-D662D6BC1416}" type="datetimeFigureOut">
               <a:rPr lang="en-GB" smtClean="0"/>
-              <a:t>19/05/2020</a:t>
+              <a:t>25/02/2021</a:t>
             </a:fld>
             <a:endParaRPr lang="en-GB"/>
           </a:p>
@@ -895,7 +901,7 @@
           <a:p>
             <a:fld id="{72AD840A-AB2C-4C90-8C87-D662D6BC1416}" type="datetimeFigureOut">
               <a:rPr lang="en-GB" smtClean="0"/>
-              <a:t>19/05/2020</a:t>
+              <a:t>25/02/2021</a:t>
             </a:fld>
             <a:endParaRPr lang="en-GB"/>
           </a:p>
@@ -1095,7 +1101,7 @@
           <a:p>
             <a:fld id="{72AD840A-AB2C-4C90-8C87-D662D6BC1416}" type="datetimeFigureOut">
               <a:rPr lang="en-GB" smtClean="0"/>
-              <a:t>19/05/2020</a:t>
+              <a:t>25/02/2021</a:t>
             </a:fld>
             <a:endParaRPr lang="en-GB"/>
           </a:p>
@@ -1371,7 +1377,7 @@
           <a:p>
             <a:fld id="{72AD840A-AB2C-4C90-8C87-D662D6BC1416}" type="datetimeFigureOut">
               <a:rPr lang="en-GB" smtClean="0"/>
-              <a:t>19/05/2020</a:t>
+              <a:t>25/02/2021</a:t>
             </a:fld>
             <a:endParaRPr lang="en-GB"/>
           </a:p>
@@ -1639,7 +1645,7 @@
           <a:p>
             <a:fld id="{72AD840A-AB2C-4C90-8C87-D662D6BC1416}" type="datetimeFigureOut">
               <a:rPr lang="en-GB" smtClean="0"/>
-              <a:t>19/05/2020</a:t>
+              <a:t>25/02/2021</a:t>
             </a:fld>
             <a:endParaRPr lang="en-GB"/>
           </a:p>
@@ -2054,7 +2060,7 @@
           <a:p>
             <a:fld id="{72AD840A-AB2C-4C90-8C87-D662D6BC1416}" type="datetimeFigureOut">
               <a:rPr lang="en-GB" smtClean="0"/>
-              <a:t>19/05/2020</a:t>
+              <a:t>25/02/2021</a:t>
             </a:fld>
             <a:endParaRPr lang="en-GB"/>
           </a:p>
@@ -2196,7 +2202,7 @@
           <a:p>
             <a:fld id="{72AD840A-AB2C-4C90-8C87-D662D6BC1416}" type="datetimeFigureOut">
               <a:rPr lang="en-GB" smtClean="0"/>
-              <a:t>19/05/2020</a:t>
+              <a:t>25/02/2021</a:t>
             </a:fld>
             <a:endParaRPr lang="en-GB"/>
           </a:p>
@@ -2309,7 +2315,7 @@
           <a:p>
             <a:fld id="{72AD840A-AB2C-4C90-8C87-D662D6BC1416}" type="datetimeFigureOut">
               <a:rPr lang="en-GB" smtClean="0"/>
-              <a:t>19/05/2020</a:t>
+              <a:t>25/02/2021</a:t>
             </a:fld>
             <a:endParaRPr lang="en-GB"/>
           </a:p>
@@ -2622,7 +2628,7 @@
           <a:p>
             <a:fld id="{72AD840A-AB2C-4C90-8C87-D662D6BC1416}" type="datetimeFigureOut">
               <a:rPr lang="en-GB" smtClean="0"/>
-              <a:t>19/05/2020</a:t>
+              <a:t>25/02/2021</a:t>
             </a:fld>
             <a:endParaRPr lang="en-GB"/>
           </a:p>
@@ -2911,7 +2917,7 @@
           <a:p>
             <a:fld id="{72AD840A-AB2C-4C90-8C87-D662D6BC1416}" type="datetimeFigureOut">
               <a:rPr lang="en-GB" smtClean="0"/>
-              <a:t>19/05/2020</a:t>
+              <a:t>25/02/2021</a:t>
             </a:fld>
             <a:endParaRPr lang="en-GB"/>
           </a:p>
@@ -3154,7 +3160,7 @@
           <a:p>
             <a:fld id="{72AD840A-AB2C-4C90-8C87-D662D6BC1416}" type="datetimeFigureOut">
               <a:rPr lang="en-GB" smtClean="0"/>
-              <a:t>19/05/2020</a:t>
+              <a:t>25/02/2021</a:t>
             </a:fld>
             <a:endParaRPr lang="en-GB"/>
           </a:p>
@@ -3585,7 +3591,7 @@
         </p:nvGrpSpPr>
         <p:grpSpPr>
           <a:xfrm>
-            <a:off x="916964" y="1758028"/>
+            <a:off x="908575" y="1758028"/>
             <a:ext cx="710588" cy="710588"/>
             <a:chOff x="4236098" y="1048282"/>
             <a:chExt cx="914742" cy="914742"/>
@@ -4083,7 +4089,7 @@
         </p:nvGrpSpPr>
         <p:grpSpPr>
           <a:xfrm>
-            <a:off x="2466837" y="1774766"/>
+            <a:off x="2458448" y="1774766"/>
             <a:ext cx="771516" cy="1278423"/>
             <a:chOff x="6106894" y="795049"/>
             <a:chExt cx="771516" cy="1278423"/>
@@ -4368,7 +4374,7 @@
         </p:nvGrpSpPr>
         <p:grpSpPr>
           <a:xfrm>
-            <a:off x="4139266" y="1592196"/>
+            <a:off x="4130877" y="1592196"/>
             <a:ext cx="710588" cy="710588"/>
             <a:chOff x="4236098" y="1048282"/>
             <a:chExt cx="914742" cy="914742"/>
@@ -4866,7 +4872,7 @@
         </p:nvSpPr>
         <p:spPr>
           <a:xfrm>
-            <a:off x="5853404" y="905157"/>
+            <a:off x="5845015" y="905157"/>
             <a:ext cx="602474" cy="611588"/>
           </a:xfrm>
           <a:prstGeom prst="rect">
@@ -4926,7 +4932,7 @@
         </p:nvGrpSpPr>
         <p:grpSpPr>
           <a:xfrm>
-            <a:off x="4123374" y="2553019"/>
+            <a:off x="4114985" y="2553019"/>
             <a:ext cx="710588" cy="710588"/>
             <a:chOff x="4236098" y="1048282"/>
             <a:chExt cx="914742" cy="914742"/>
@@ -5424,7 +5430,7 @@
         </p:nvGrpSpPr>
         <p:grpSpPr>
           <a:xfrm>
-            <a:off x="4123374" y="3506560"/>
+            <a:off x="4114985" y="3506560"/>
             <a:ext cx="710588" cy="710588"/>
             <a:chOff x="4236098" y="1048282"/>
             <a:chExt cx="914742" cy="914742"/>
@@ -5922,7 +5928,7 @@
         </p:nvGrpSpPr>
         <p:grpSpPr>
           <a:xfrm>
-            <a:off x="4139266" y="628180"/>
+            <a:off x="4130877" y="628180"/>
             <a:ext cx="710588" cy="710588"/>
             <a:chOff x="4236098" y="1048282"/>
             <a:chExt cx="914742" cy="914742"/>
@@ -6424,7 +6430,7 @@
         </p:nvCxnSpPr>
         <p:spPr>
           <a:xfrm flipV="1">
-            <a:off x="3238352" y="983474"/>
+            <a:off x="3229963" y="983474"/>
             <a:ext cx="900914" cy="949912"/>
           </a:xfrm>
           <a:prstGeom prst="curvedConnector3">
@@ -6467,7 +6473,7 @@
         </p:nvCxnSpPr>
         <p:spPr>
           <a:xfrm flipV="1">
-            <a:off x="3238353" y="1947490"/>
+            <a:off x="3229964" y="1947490"/>
             <a:ext cx="900913" cy="303136"/>
           </a:xfrm>
           <a:prstGeom prst="curvedConnector3">
@@ -6512,7 +6518,7 @@
         </p:nvCxnSpPr>
         <p:spPr>
           <a:xfrm>
-            <a:off x="3238352" y="2567866"/>
+            <a:off x="3229963" y="2567866"/>
             <a:ext cx="885022" cy="340447"/>
           </a:xfrm>
           <a:prstGeom prst="curvedConnector3">
@@ -6555,7 +6561,7 @@
         </p:nvCxnSpPr>
         <p:spPr>
           <a:xfrm>
-            <a:off x="3238353" y="2894569"/>
+            <a:off x="3229964" y="2894569"/>
             <a:ext cx="885021" cy="967285"/>
           </a:xfrm>
           <a:prstGeom prst="curvedConnector3">
@@ -6600,7 +6606,7 @@
         </p:nvCxnSpPr>
         <p:spPr>
           <a:xfrm>
-            <a:off x="4849854" y="983474"/>
+            <a:off x="4841465" y="983474"/>
             <a:ext cx="1003550" cy="227477"/>
           </a:xfrm>
           <a:prstGeom prst="curvedConnector3">
@@ -6643,7 +6649,7 @@
         </p:nvCxnSpPr>
         <p:spPr>
           <a:xfrm rot="5400000">
-            <a:off x="5286876" y="1079724"/>
+            <a:off x="5278487" y="1079724"/>
             <a:ext cx="430745" cy="1304787"/>
           </a:xfrm>
           <a:prstGeom prst="curvedConnector2">
@@ -6682,7 +6688,7 @@
         </p:nvGrpSpPr>
         <p:grpSpPr>
           <a:xfrm>
-            <a:off x="5852674" y="3261324"/>
+            <a:off x="5844285" y="3261324"/>
             <a:ext cx="771516" cy="1269093"/>
             <a:chOff x="6908910" y="4194022"/>
             <a:chExt cx="771516" cy="1269093"/>
@@ -6971,7 +6977,7 @@
         </p:nvCxnSpPr>
         <p:spPr>
           <a:xfrm>
-            <a:off x="4833962" y="3861854"/>
+            <a:off x="4825573" y="3861854"/>
             <a:ext cx="1018714" cy="34017"/>
           </a:xfrm>
           <a:prstGeom prst="curvedConnector3">
@@ -7012,7 +7018,7 @@
         </p:nvSpPr>
         <p:spPr>
           <a:xfrm>
-            <a:off x="7340304" y="3246999"/>
+            <a:off x="7331915" y="3246999"/>
             <a:ext cx="602474" cy="611588"/>
           </a:xfrm>
           <a:prstGeom prst="rect">
@@ -7072,7 +7078,7 @@
         </p:nvSpPr>
         <p:spPr>
           <a:xfrm>
-            <a:off x="7340304" y="4012477"/>
+            <a:off x="7331915" y="4012477"/>
             <a:ext cx="602474" cy="611588"/>
           </a:xfrm>
           <a:prstGeom prst="rect">
@@ -7132,7 +7138,7 @@
         </p:nvSpPr>
         <p:spPr>
           <a:xfrm>
-            <a:off x="7340304" y="4777955"/>
+            <a:off x="7331915" y="4777955"/>
             <a:ext cx="602474" cy="611588"/>
           </a:xfrm>
           <a:prstGeom prst="rect">
@@ -7192,7 +7198,7 @@
         </p:nvSpPr>
         <p:spPr>
           <a:xfrm>
-            <a:off x="7340304" y="2481521"/>
+            <a:off x="7331915" y="2481521"/>
             <a:ext cx="602474" cy="611588"/>
           </a:xfrm>
           <a:prstGeom prst="rect">
@@ -7256,7 +7262,7 @@
         </p:nvCxnSpPr>
         <p:spPr>
           <a:xfrm>
-            <a:off x="1627552" y="2113322"/>
+            <a:off x="1619163" y="2113322"/>
             <a:ext cx="839287" cy="300656"/>
           </a:xfrm>
           <a:prstGeom prst="curvedConnector3">
@@ -7301,7 +7307,7 @@
         </p:nvCxnSpPr>
         <p:spPr>
           <a:xfrm flipV="1">
-            <a:off x="6624189" y="2787315"/>
+            <a:off x="6615800" y="2787315"/>
             <a:ext cx="716115" cy="632629"/>
           </a:xfrm>
           <a:prstGeom prst="curvedConnector3">
@@ -7346,7 +7352,7 @@
         </p:nvCxnSpPr>
         <p:spPr>
           <a:xfrm flipV="1">
-            <a:off x="6624190" y="3552793"/>
+            <a:off x="6615801" y="3552793"/>
             <a:ext cx="716114" cy="184391"/>
           </a:xfrm>
           <a:prstGeom prst="curvedConnector3">
@@ -7391,7 +7397,7 @@
         </p:nvCxnSpPr>
         <p:spPr>
           <a:xfrm>
-            <a:off x="6624189" y="4054424"/>
+            <a:off x="6615800" y="4054424"/>
             <a:ext cx="716115" cy="263847"/>
           </a:xfrm>
           <a:prstGeom prst="curvedConnector3">
@@ -7436,7 +7442,7 @@
         </p:nvCxnSpPr>
         <p:spPr>
           <a:xfrm>
-            <a:off x="6624190" y="4371796"/>
+            <a:off x="6615801" y="4371796"/>
             <a:ext cx="716114" cy="711953"/>
           </a:xfrm>
           <a:prstGeom prst="curvedConnector3">
@@ -11984,19 +11990,8 @@
                 <a:latin typeface="Segoe UI" panose="020B0502040204020203" pitchFamily="34" charset="0"/>
                 <a:cs typeface="Segoe UI" panose="020B0502040204020203" pitchFamily="34" charset="0"/>
               </a:rPr>
-              <a:t>P5</a:t>
+              <a:t>P5.TO1/2/3/4</a:t>
             </a:r>
-            <a:r>
-              <a:rPr lang="en-US" sz="1050">
-                <a:latin typeface="Segoe UI" panose="020B0502040204020203" pitchFamily="34" charset="0"/>
-                <a:cs typeface="Segoe UI" panose="020B0502040204020203" pitchFamily="34" charset="0"/>
-              </a:rPr>
-              <a:t>.TO1/2/3/4</a:t>
-            </a:r>
-            <a:endParaRPr lang="en-US" sz="1050" dirty="0">
-              <a:latin typeface="Segoe UI" panose="020B0502040204020203" pitchFamily="34" charset="0"/>
-              <a:cs typeface="Segoe UI" panose="020B0502040204020203" pitchFamily="34" charset="0"/>
-            </a:endParaRPr>
           </a:p>
         </p:txBody>
       </p:sp>
@@ -12004,6 +11999,3527 @@
     <p:extLst>
       <p:ext uri="{BB962C8B-B14F-4D97-AF65-F5344CB8AC3E}">
         <p14:creationId xmlns:p14="http://schemas.microsoft.com/office/powerpoint/2010/main" val="915570220"/>
+      </p:ext>
+    </p:extLst>
+  </p:cSld>
+  <p:clrMapOvr>
+    <a:masterClrMapping/>
+  </p:clrMapOvr>
+</p:sld>
+</file>
+
+<file path=ppt/slides/slide3.xml><?xml version="1.0" encoding="utf-8"?>
+<p:sld xmlns:a="http://schemas.openxmlformats.org/drawingml/2006/main" xmlns:r="http://schemas.openxmlformats.org/officeDocument/2006/relationships" xmlns:p="http://schemas.openxmlformats.org/presentationml/2006/main">
+  <p:cSld>
+    <p:spTree>
+      <p:nvGrpSpPr>
+        <p:cNvPr id="1" name=""/>
+        <p:cNvGrpSpPr/>
+        <p:nvPr/>
+      </p:nvGrpSpPr>
+      <p:grpSpPr>
+        <a:xfrm>
+          <a:off x="0" y="0"/>
+          <a:ext cx="0" cy="0"/>
+          <a:chOff x="0" y="0"/>
+          <a:chExt cx="0" cy="0"/>
+        </a:xfrm>
+      </p:grpSpPr>
+      <p:grpSp>
+        <p:nvGrpSpPr>
+          <p:cNvPr id="3" name="Group 2">
+            <a:extLst>
+              <a:ext uri="{FF2B5EF4-FFF2-40B4-BE49-F238E27FC236}">
+                <a16:creationId xmlns:a16="http://schemas.microsoft.com/office/drawing/2014/main" id="{9C7EF3FD-DEBA-4071-A92F-C3A761C8DBDC}"/>
+              </a:ext>
+            </a:extLst>
+          </p:cNvPr>
+          <p:cNvGrpSpPr/>
+          <p:nvPr/>
+        </p:nvGrpSpPr>
+        <p:grpSpPr>
+          <a:xfrm>
+            <a:off x="4139267" y="1751795"/>
+            <a:ext cx="710588" cy="710588"/>
+            <a:chOff x="4592272" y="1943858"/>
+            <a:chExt cx="710588" cy="710588"/>
+          </a:xfrm>
+        </p:grpSpPr>
+        <p:sp>
+          <p:nvSpPr>
+            <p:cNvPr id="111" name="Oval 110">
+              <a:extLst>
+                <a:ext uri="{FF2B5EF4-FFF2-40B4-BE49-F238E27FC236}">
+                  <a16:creationId xmlns:a16="http://schemas.microsoft.com/office/drawing/2014/main" id="{847E718F-222B-4017-9965-8E096ABDE8E2}"/>
+                </a:ext>
+              </a:extLst>
+            </p:cNvPr>
+            <p:cNvSpPr/>
+            <p:nvPr/>
+          </p:nvSpPr>
+          <p:spPr>
+            <a:xfrm>
+              <a:off x="4592272" y="1943858"/>
+              <a:ext cx="710588" cy="710588"/>
+            </a:xfrm>
+            <a:prstGeom prst="ellipse">
+              <a:avLst/>
+            </a:prstGeom>
+            <a:effectLst>
+              <a:innerShdw blurRad="63500" dist="50800" dir="8100000">
+                <a:prstClr val="black">
+                  <a:alpha val="50000"/>
+                </a:prstClr>
+              </a:innerShdw>
+            </a:effectLst>
+          </p:spPr>
+          <p:style>
+            <a:lnRef idx="2">
+              <a:schemeClr val="accent1"/>
+            </a:lnRef>
+            <a:fillRef idx="1">
+              <a:schemeClr val="lt1"/>
+            </a:fillRef>
+            <a:effectRef idx="0">
+              <a:schemeClr val="accent1"/>
+            </a:effectRef>
+            <a:fontRef idx="minor">
+              <a:schemeClr val="dk1"/>
+            </a:fontRef>
+          </p:style>
+          <p:txBody>
+            <a:bodyPr rtlCol="0" anchor="ctr"/>
+            <a:lstStyle/>
+            <a:p>
+              <a:pPr algn="ctr"/>
+              <a:endParaRPr lang="en-GB"/>
+            </a:p>
+          </p:txBody>
+        </p:sp>
+        <p:sp>
+          <p:nvSpPr>
+            <p:cNvPr id="112" name="Oval 111">
+              <a:extLst>
+                <a:ext uri="{FF2B5EF4-FFF2-40B4-BE49-F238E27FC236}">
+                  <a16:creationId xmlns:a16="http://schemas.microsoft.com/office/drawing/2014/main" id="{6910F399-D36F-4B04-BF33-868294AFDC21}"/>
+                </a:ext>
+              </a:extLst>
+            </p:cNvPr>
+            <p:cNvSpPr/>
+            <p:nvPr/>
+          </p:nvSpPr>
+          <p:spPr>
+            <a:xfrm>
+              <a:off x="4836372" y="2187958"/>
+              <a:ext cx="224505" cy="224505"/>
+            </a:xfrm>
+            <a:prstGeom prst="ellipse">
+              <a:avLst/>
+            </a:prstGeom>
+            <a:effectLst>
+              <a:innerShdw blurRad="63500" dist="50800" dir="18900000">
+                <a:prstClr val="black">
+                  <a:alpha val="50000"/>
+                </a:prstClr>
+              </a:innerShdw>
+            </a:effectLst>
+          </p:spPr>
+          <p:style>
+            <a:lnRef idx="2">
+              <a:schemeClr val="accent1"/>
+            </a:lnRef>
+            <a:fillRef idx="1">
+              <a:schemeClr val="lt1"/>
+            </a:fillRef>
+            <a:effectRef idx="0">
+              <a:schemeClr val="accent1"/>
+            </a:effectRef>
+            <a:fontRef idx="minor">
+              <a:schemeClr val="dk1"/>
+            </a:fontRef>
+          </p:style>
+          <p:txBody>
+            <a:bodyPr rtlCol="0" anchor="ctr"/>
+            <a:lstStyle/>
+            <a:p>
+              <a:pPr algn="ctr"/>
+              <a:endParaRPr lang="en-GB"/>
+            </a:p>
+          </p:txBody>
+        </p:sp>
+        <p:cxnSp>
+          <p:nvCxnSpPr>
+            <p:cNvPr id="113" name="Straight Connector 112">
+              <a:extLst>
+                <a:ext uri="{FF2B5EF4-FFF2-40B4-BE49-F238E27FC236}">
+                  <a16:creationId xmlns:a16="http://schemas.microsoft.com/office/drawing/2014/main" id="{5C07B624-D177-44AC-B8AB-3DC71AA27E36}"/>
+                </a:ext>
+              </a:extLst>
+            </p:cNvPr>
+            <p:cNvCxnSpPr>
+              <a:stCxn id="111" idx="0"/>
+              <a:endCxn id="112" idx="0"/>
+            </p:cNvCxnSpPr>
+            <p:nvPr/>
+          </p:nvCxnSpPr>
+          <p:spPr>
+            <a:xfrm>
+              <a:off x="4947566" y="1943858"/>
+              <a:ext cx="1058" cy="244100"/>
+            </a:xfrm>
+            <a:prstGeom prst="line">
+              <a:avLst/>
+            </a:prstGeom>
+            <a:ln>
+              <a:solidFill>
+                <a:schemeClr val="bg2">
+                  <a:lumMod val="90000"/>
+                </a:schemeClr>
+              </a:solidFill>
+            </a:ln>
+          </p:spPr>
+          <p:style>
+            <a:lnRef idx="1">
+              <a:schemeClr val="accent1"/>
+            </a:lnRef>
+            <a:fillRef idx="0">
+              <a:schemeClr val="accent1"/>
+            </a:fillRef>
+            <a:effectRef idx="0">
+              <a:schemeClr val="accent1"/>
+            </a:effectRef>
+            <a:fontRef idx="minor">
+              <a:schemeClr val="tx1"/>
+            </a:fontRef>
+          </p:style>
+        </p:cxnSp>
+        <p:cxnSp>
+          <p:nvCxnSpPr>
+            <p:cNvPr id="114" name="Straight Connector 113">
+              <a:extLst>
+                <a:ext uri="{FF2B5EF4-FFF2-40B4-BE49-F238E27FC236}">
+                  <a16:creationId xmlns:a16="http://schemas.microsoft.com/office/drawing/2014/main" id="{605C5B40-94DD-47E9-A831-8BF6176410C9}"/>
+                </a:ext>
+              </a:extLst>
+            </p:cNvPr>
+            <p:cNvCxnSpPr>
+              <a:cxnSpLocks/>
+              <a:stCxn id="111" idx="7"/>
+              <a:endCxn id="112" idx="7"/>
+            </p:cNvCxnSpPr>
+            <p:nvPr/>
+          </p:nvCxnSpPr>
+          <p:spPr>
+            <a:xfrm flipH="1">
+              <a:off x="5027999" y="2047921"/>
+              <a:ext cx="170798" cy="172914"/>
+            </a:xfrm>
+            <a:prstGeom prst="line">
+              <a:avLst/>
+            </a:prstGeom>
+            <a:ln>
+              <a:solidFill>
+                <a:schemeClr val="bg2">
+                  <a:lumMod val="90000"/>
+                </a:schemeClr>
+              </a:solidFill>
+            </a:ln>
+          </p:spPr>
+          <p:style>
+            <a:lnRef idx="1">
+              <a:schemeClr val="accent1"/>
+            </a:lnRef>
+            <a:fillRef idx="0">
+              <a:schemeClr val="accent1"/>
+            </a:fillRef>
+            <a:effectRef idx="0">
+              <a:schemeClr val="accent1"/>
+            </a:effectRef>
+            <a:fontRef idx="minor">
+              <a:schemeClr val="tx1"/>
+            </a:fontRef>
+          </p:style>
+        </p:cxnSp>
+        <p:cxnSp>
+          <p:nvCxnSpPr>
+            <p:cNvPr id="115" name="Straight Connector 114">
+              <a:extLst>
+                <a:ext uri="{FF2B5EF4-FFF2-40B4-BE49-F238E27FC236}">
+                  <a16:creationId xmlns:a16="http://schemas.microsoft.com/office/drawing/2014/main" id="{EB59AF18-5D0F-45B2-963B-667E995DED2F}"/>
+                </a:ext>
+              </a:extLst>
+            </p:cNvPr>
+            <p:cNvCxnSpPr>
+              <a:cxnSpLocks/>
+              <a:stCxn id="111" idx="6"/>
+              <a:endCxn id="112" idx="6"/>
+            </p:cNvCxnSpPr>
+            <p:nvPr/>
+          </p:nvCxnSpPr>
+          <p:spPr>
+            <a:xfrm flipH="1">
+              <a:off x="5060877" y="2299152"/>
+              <a:ext cx="241983" cy="1058"/>
+            </a:xfrm>
+            <a:prstGeom prst="line">
+              <a:avLst/>
+            </a:prstGeom>
+            <a:ln>
+              <a:solidFill>
+                <a:schemeClr val="bg2">
+                  <a:lumMod val="90000"/>
+                </a:schemeClr>
+              </a:solidFill>
+            </a:ln>
+          </p:spPr>
+          <p:style>
+            <a:lnRef idx="1">
+              <a:schemeClr val="accent1"/>
+            </a:lnRef>
+            <a:fillRef idx="0">
+              <a:schemeClr val="accent1"/>
+            </a:fillRef>
+            <a:effectRef idx="0">
+              <a:schemeClr val="accent1"/>
+            </a:effectRef>
+            <a:fontRef idx="minor">
+              <a:schemeClr val="tx1"/>
+            </a:fontRef>
+          </p:style>
+        </p:cxnSp>
+        <p:cxnSp>
+          <p:nvCxnSpPr>
+            <p:cNvPr id="116" name="Straight Connector 115">
+              <a:extLst>
+                <a:ext uri="{FF2B5EF4-FFF2-40B4-BE49-F238E27FC236}">
+                  <a16:creationId xmlns:a16="http://schemas.microsoft.com/office/drawing/2014/main" id="{304464C3-9C83-43D4-856E-F245F2FA8D70}"/>
+                </a:ext>
+              </a:extLst>
+            </p:cNvPr>
+            <p:cNvCxnSpPr>
+              <a:cxnSpLocks/>
+              <a:stCxn id="112" idx="2"/>
+              <a:endCxn id="111" idx="2"/>
+            </p:cNvCxnSpPr>
+            <p:nvPr/>
+          </p:nvCxnSpPr>
+          <p:spPr>
+            <a:xfrm flipH="1" flipV="1">
+              <a:off x="4592272" y="2299152"/>
+              <a:ext cx="244100" cy="1058"/>
+            </a:xfrm>
+            <a:prstGeom prst="line">
+              <a:avLst/>
+            </a:prstGeom>
+            <a:ln>
+              <a:solidFill>
+                <a:schemeClr val="bg2">
+                  <a:lumMod val="90000"/>
+                </a:schemeClr>
+              </a:solidFill>
+            </a:ln>
+          </p:spPr>
+          <p:style>
+            <a:lnRef idx="1">
+              <a:schemeClr val="accent1"/>
+            </a:lnRef>
+            <a:fillRef idx="0">
+              <a:schemeClr val="accent1"/>
+            </a:fillRef>
+            <a:effectRef idx="0">
+              <a:schemeClr val="accent1"/>
+            </a:effectRef>
+            <a:fontRef idx="minor">
+              <a:schemeClr val="tx1"/>
+            </a:fontRef>
+          </p:style>
+        </p:cxnSp>
+        <p:cxnSp>
+          <p:nvCxnSpPr>
+            <p:cNvPr id="117" name="Straight Connector 116">
+              <a:extLst>
+                <a:ext uri="{FF2B5EF4-FFF2-40B4-BE49-F238E27FC236}">
+                  <a16:creationId xmlns:a16="http://schemas.microsoft.com/office/drawing/2014/main" id="{09D9EC27-C804-4CBC-83AD-559E920B8500}"/>
+                </a:ext>
+              </a:extLst>
+            </p:cNvPr>
+            <p:cNvCxnSpPr>
+              <a:cxnSpLocks/>
+              <a:stCxn id="112" idx="1"/>
+              <a:endCxn id="111" idx="1"/>
+            </p:cNvCxnSpPr>
+            <p:nvPr/>
+          </p:nvCxnSpPr>
+          <p:spPr>
+            <a:xfrm flipH="1" flipV="1">
+              <a:off x="4696335" y="2047921"/>
+              <a:ext cx="172914" cy="172914"/>
+            </a:xfrm>
+            <a:prstGeom prst="line">
+              <a:avLst/>
+            </a:prstGeom>
+            <a:ln>
+              <a:solidFill>
+                <a:schemeClr val="bg2">
+                  <a:lumMod val="90000"/>
+                </a:schemeClr>
+              </a:solidFill>
+            </a:ln>
+          </p:spPr>
+          <p:style>
+            <a:lnRef idx="1">
+              <a:schemeClr val="accent1"/>
+            </a:lnRef>
+            <a:fillRef idx="0">
+              <a:schemeClr val="accent1"/>
+            </a:fillRef>
+            <a:effectRef idx="0">
+              <a:schemeClr val="accent1"/>
+            </a:effectRef>
+            <a:fontRef idx="minor">
+              <a:schemeClr val="tx1"/>
+            </a:fontRef>
+          </p:style>
+        </p:cxnSp>
+        <p:cxnSp>
+          <p:nvCxnSpPr>
+            <p:cNvPr id="118" name="Straight Connector 117">
+              <a:extLst>
+                <a:ext uri="{FF2B5EF4-FFF2-40B4-BE49-F238E27FC236}">
+                  <a16:creationId xmlns:a16="http://schemas.microsoft.com/office/drawing/2014/main" id="{84C69DA2-B208-45DA-B512-8B1158CE675F}"/>
+                </a:ext>
+              </a:extLst>
+            </p:cNvPr>
+            <p:cNvCxnSpPr>
+              <a:cxnSpLocks/>
+              <a:stCxn id="111" idx="5"/>
+              <a:endCxn id="112" idx="5"/>
+            </p:cNvCxnSpPr>
+            <p:nvPr/>
+          </p:nvCxnSpPr>
+          <p:spPr>
+            <a:xfrm flipH="1" flipV="1">
+              <a:off x="5027999" y="2379585"/>
+              <a:ext cx="170798" cy="170798"/>
+            </a:xfrm>
+            <a:prstGeom prst="line">
+              <a:avLst/>
+            </a:prstGeom>
+            <a:ln>
+              <a:solidFill>
+                <a:schemeClr val="bg2">
+                  <a:lumMod val="90000"/>
+                </a:schemeClr>
+              </a:solidFill>
+            </a:ln>
+          </p:spPr>
+          <p:style>
+            <a:lnRef idx="1">
+              <a:schemeClr val="accent1"/>
+            </a:lnRef>
+            <a:fillRef idx="0">
+              <a:schemeClr val="accent1"/>
+            </a:fillRef>
+            <a:effectRef idx="0">
+              <a:schemeClr val="accent1"/>
+            </a:effectRef>
+            <a:fontRef idx="minor">
+              <a:schemeClr val="tx1"/>
+            </a:fontRef>
+          </p:style>
+        </p:cxnSp>
+        <p:cxnSp>
+          <p:nvCxnSpPr>
+            <p:cNvPr id="119" name="Straight Connector 118">
+              <a:extLst>
+                <a:ext uri="{FF2B5EF4-FFF2-40B4-BE49-F238E27FC236}">
+                  <a16:creationId xmlns:a16="http://schemas.microsoft.com/office/drawing/2014/main" id="{5A8F21C5-2E30-4316-A877-2EF60FBE0891}"/>
+                </a:ext>
+              </a:extLst>
+            </p:cNvPr>
+            <p:cNvCxnSpPr>
+              <a:cxnSpLocks/>
+              <a:stCxn id="111" idx="4"/>
+              <a:endCxn id="112" idx="4"/>
+            </p:cNvCxnSpPr>
+            <p:nvPr/>
+          </p:nvCxnSpPr>
+          <p:spPr>
+            <a:xfrm flipV="1">
+              <a:off x="4947566" y="2412463"/>
+              <a:ext cx="1058" cy="241983"/>
+            </a:xfrm>
+            <a:prstGeom prst="line">
+              <a:avLst/>
+            </a:prstGeom>
+            <a:ln>
+              <a:solidFill>
+                <a:schemeClr val="bg2">
+                  <a:lumMod val="90000"/>
+                </a:schemeClr>
+              </a:solidFill>
+            </a:ln>
+          </p:spPr>
+          <p:style>
+            <a:lnRef idx="1">
+              <a:schemeClr val="accent1"/>
+            </a:lnRef>
+            <a:fillRef idx="0">
+              <a:schemeClr val="accent1"/>
+            </a:fillRef>
+            <a:effectRef idx="0">
+              <a:schemeClr val="accent1"/>
+            </a:effectRef>
+            <a:fontRef idx="minor">
+              <a:schemeClr val="tx1"/>
+            </a:fontRef>
+          </p:style>
+        </p:cxnSp>
+        <p:cxnSp>
+          <p:nvCxnSpPr>
+            <p:cNvPr id="120" name="Straight Connector 119">
+              <a:extLst>
+                <a:ext uri="{FF2B5EF4-FFF2-40B4-BE49-F238E27FC236}">
+                  <a16:creationId xmlns:a16="http://schemas.microsoft.com/office/drawing/2014/main" id="{09A5F60C-41CD-42E5-8F72-A47D176509B0}"/>
+                </a:ext>
+              </a:extLst>
+            </p:cNvPr>
+            <p:cNvCxnSpPr>
+              <a:cxnSpLocks/>
+              <a:stCxn id="111" idx="3"/>
+              <a:endCxn id="112" idx="3"/>
+            </p:cNvCxnSpPr>
+            <p:nvPr/>
+          </p:nvCxnSpPr>
+          <p:spPr>
+            <a:xfrm flipV="1">
+              <a:off x="4696335" y="2379585"/>
+              <a:ext cx="172914" cy="170798"/>
+            </a:xfrm>
+            <a:prstGeom prst="line">
+              <a:avLst/>
+            </a:prstGeom>
+            <a:ln>
+              <a:solidFill>
+                <a:schemeClr val="bg2">
+                  <a:lumMod val="90000"/>
+                </a:schemeClr>
+              </a:solidFill>
+            </a:ln>
+          </p:spPr>
+          <p:style>
+            <a:lnRef idx="1">
+              <a:schemeClr val="accent1"/>
+            </a:lnRef>
+            <a:fillRef idx="0">
+              <a:schemeClr val="accent1"/>
+            </a:fillRef>
+            <a:effectRef idx="0">
+              <a:schemeClr val="accent1"/>
+            </a:effectRef>
+            <a:fontRef idx="minor">
+              <a:schemeClr val="tx1"/>
+            </a:fontRef>
+          </p:style>
+        </p:cxnSp>
+      </p:grpSp>
+      <p:cxnSp>
+        <p:nvCxnSpPr>
+          <p:cNvPr id="134" name="Connector: Elbow 121">
+            <a:extLst>
+              <a:ext uri="{FF2B5EF4-FFF2-40B4-BE49-F238E27FC236}">
+                <a16:creationId xmlns:a16="http://schemas.microsoft.com/office/drawing/2014/main" id="{05DCC4E7-0AAB-47BB-B8CB-102351F86C77}"/>
+              </a:ext>
+            </a:extLst>
+          </p:cNvPr>
+          <p:cNvCxnSpPr>
+            <a:cxnSpLocks/>
+            <a:stCxn id="132" idx="6"/>
+            <a:endCxn id="86" idx="1"/>
+          </p:cNvCxnSpPr>
+          <p:nvPr/>
+        </p:nvCxnSpPr>
+        <p:spPr>
+          <a:xfrm>
+            <a:off x="4909336" y="5255082"/>
+            <a:ext cx="653928" cy="1436"/>
+          </a:xfrm>
+          <a:prstGeom prst="curvedConnector3">
+            <a:avLst>
+              <a:gd name="adj1" fmla="val 50000"/>
+            </a:avLst>
+          </a:prstGeom>
+          <a:ln>
+            <a:tailEnd type="triangle"/>
+          </a:ln>
+        </p:spPr>
+        <p:style>
+          <a:lnRef idx="1">
+            <a:schemeClr val="accent1"/>
+          </a:lnRef>
+          <a:fillRef idx="0">
+            <a:schemeClr val="accent1"/>
+          </a:fillRef>
+          <a:effectRef idx="0">
+            <a:schemeClr val="accent1"/>
+          </a:effectRef>
+          <a:fontRef idx="minor">
+            <a:schemeClr val="tx1"/>
+          </a:fontRef>
+        </p:style>
+      </p:cxnSp>
+      <p:sp>
+        <p:nvSpPr>
+          <p:cNvPr id="2" name="Title 1">
+            <a:extLst>
+              <a:ext uri="{FF2B5EF4-FFF2-40B4-BE49-F238E27FC236}">
+                <a16:creationId xmlns:a16="http://schemas.microsoft.com/office/drawing/2014/main" id="{F65C4074-BF64-405E-A8B4-5857E0DDEC57}"/>
+              </a:ext>
+            </a:extLst>
+          </p:cNvPr>
+          <p:cNvSpPr>
+            <a:spLocks noGrp="1"/>
+          </p:cNvSpPr>
+          <p:nvPr>
+            <p:ph type="title"/>
+          </p:nvPr>
+        </p:nvSpPr>
+        <p:spPr>
+          <a:xfrm>
+            <a:off x="838200" y="365125"/>
+            <a:ext cx="10515600" cy="594107"/>
+          </a:xfrm>
+        </p:spPr>
+        <p:txBody>
+          <a:bodyPr>
+            <a:noAutofit/>
+          </a:bodyPr>
+          <a:lstStyle/>
+          <a:p>
+            <a:r>
+              <a:rPr lang="en-GB" sz="2800" dirty="0">
+                <a:latin typeface="Segoe UI Semibold" panose="020B0702040204020203" pitchFamily="34" charset="0"/>
+                <a:cs typeface="Segoe UI Semibold" panose="020B0702040204020203" pitchFamily="34" charset="0"/>
+              </a:rPr>
+              <a:t>Transactional object updates</a:t>
+            </a:r>
+          </a:p>
+        </p:txBody>
+      </p:sp>
+      <p:grpSp>
+        <p:nvGrpSpPr>
+          <p:cNvPr id="16" name="Group 15">
+            <a:extLst>
+              <a:ext uri="{FF2B5EF4-FFF2-40B4-BE49-F238E27FC236}">
+                <a16:creationId xmlns:a16="http://schemas.microsoft.com/office/drawing/2014/main" id="{F4E2992C-2407-4038-8325-052C4891F6BB}"/>
+              </a:ext>
+            </a:extLst>
+          </p:cNvPr>
+          <p:cNvGrpSpPr/>
+          <p:nvPr/>
+        </p:nvGrpSpPr>
+        <p:grpSpPr>
+          <a:xfrm>
+            <a:off x="4193324" y="2826125"/>
+            <a:ext cx="602474" cy="611588"/>
+            <a:chOff x="6306410" y="2220835"/>
+            <a:chExt cx="602474" cy="611588"/>
+          </a:xfrm>
+        </p:grpSpPr>
+        <p:sp>
+          <p:nvSpPr>
+            <p:cNvPr id="64" name="Rectangle 63">
+              <a:extLst>
+                <a:ext uri="{FF2B5EF4-FFF2-40B4-BE49-F238E27FC236}">
+                  <a16:creationId xmlns:a16="http://schemas.microsoft.com/office/drawing/2014/main" id="{D55BDD0C-819B-421F-B9D2-D08C95D415B9}"/>
+                </a:ext>
+              </a:extLst>
+            </p:cNvPr>
+            <p:cNvSpPr/>
+            <p:nvPr/>
+          </p:nvSpPr>
+          <p:spPr>
+            <a:xfrm>
+              <a:off x="6306410" y="2220835"/>
+              <a:ext cx="602474" cy="611588"/>
+            </a:xfrm>
+            <a:prstGeom prst="rect">
+              <a:avLst/>
+            </a:prstGeom>
+            <a:effectLst>
+              <a:innerShdw blurRad="63500" dist="50800" dir="8100000">
+                <a:prstClr val="black">
+                  <a:alpha val="50000"/>
+                </a:prstClr>
+              </a:innerShdw>
+            </a:effectLst>
+          </p:spPr>
+          <p:style>
+            <a:lnRef idx="2">
+              <a:schemeClr val="accent1"/>
+            </a:lnRef>
+            <a:fillRef idx="1">
+              <a:schemeClr val="lt1"/>
+            </a:fillRef>
+            <a:effectRef idx="0">
+              <a:schemeClr val="accent1"/>
+            </a:effectRef>
+            <a:fontRef idx="minor">
+              <a:schemeClr val="dk1"/>
+            </a:fontRef>
+          </p:style>
+          <p:txBody>
+            <a:bodyPr rot="0" spcFirstLastPara="0" vertOverflow="overflow" horzOverflow="overflow" vert="horz" wrap="square" lIns="91440" tIns="45720" rIns="91440" bIns="45720" numCol="1" spcCol="0" rtlCol="0" fromWordArt="0" anchor="ctr" anchorCtr="0" forceAA="0" compatLnSpc="1">
+              <a:prstTxWarp prst="textNoShape">
+                <a:avLst/>
+              </a:prstTxWarp>
+              <a:noAutofit/>
+            </a:bodyPr>
+            <a:lstStyle/>
+            <a:p>
+              <a:pPr algn="ctr"/>
+              <a:endParaRPr lang="en-GB" dirty="0">
+                <a:solidFill>
+                  <a:schemeClr val="dk1"/>
+                </a:solidFill>
+              </a:endParaRPr>
+            </a:p>
+          </p:txBody>
+        </p:sp>
+        <p:cxnSp>
+          <p:nvCxnSpPr>
+            <p:cNvPr id="91" name="Straight Connector 90">
+              <a:extLst>
+                <a:ext uri="{FF2B5EF4-FFF2-40B4-BE49-F238E27FC236}">
+                  <a16:creationId xmlns:a16="http://schemas.microsoft.com/office/drawing/2014/main" id="{92422B9D-0BFE-4CA7-B71F-DEB6FEB74245}"/>
+                </a:ext>
+              </a:extLst>
+            </p:cNvPr>
+            <p:cNvCxnSpPr>
+              <a:cxnSpLocks/>
+              <a:stCxn id="64" idx="0"/>
+              <a:endCxn id="64" idx="2"/>
+            </p:cNvCxnSpPr>
+            <p:nvPr/>
+          </p:nvCxnSpPr>
+          <p:spPr>
+            <a:xfrm>
+              <a:off x="6607647" y="2220835"/>
+              <a:ext cx="0" cy="611588"/>
+            </a:xfrm>
+            <a:prstGeom prst="line">
+              <a:avLst/>
+            </a:prstGeom>
+            <a:ln>
+              <a:solidFill>
+                <a:schemeClr val="bg2">
+                  <a:lumMod val="90000"/>
+                </a:schemeClr>
+              </a:solidFill>
+            </a:ln>
+          </p:spPr>
+          <p:style>
+            <a:lnRef idx="1">
+              <a:schemeClr val="accent1"/>
+            </a:lnRef>
+            <a:fillRef idx="0">
+              <a:schemeClr val="accent1"/>
+            </a:fillRef>
+            <a:effectRef idx="0">
+              <a:schemeClr val="accent1"/>
+            </a:effectRef>
+            <a:fontRef idx="minor">
+              <a:schemeClr val="tx1"/>
+            </a:fontRef>
+          </p:style>
+        </p:cxnSp>
+        <p:cxnSp>
+          <p:nvCxnSpPr>
+            <p:cNvPr id="96" name="Straight Connector 95">
+              <a:extLst>
+                <a:ext uri="{FF2B5EF4-FFF2-40B4-BE49-F238E27FC236}">
+                  <a16:creationId xmlns:a16="http://schemas.microsoft.com/office/drawing/2014/main" id="{F29D530A-B264-4C38-8C70-A353BC32B81F}"/>
+                </a:ext>
+              </a:extLst>
+            </p:cNvPr>
+            <p:cNvCxnSpPr>
+              <a:cxnSpLocks/>
+              <a:stCxn id="64" idx="1"/>
+              <a:endCxn id="64" idx="3"/>
+            </p:cNvCxnSpPr>
+            <p:nvPr/>
+          </p:nvCxnSpPr>
+          <p:spPr>
+            <a:xfrm>
+              <a:off x="6306410" y="2526629"/>
+              <a:ext cx="602474" cy="0"/>
+            </a:xfrm>
+            <a:prstGeom prst="line">
+              <a:avLst/>
+            </a:prstGeom>
+            <a:ln>
+              <a:solidFill>
+                <a:schemeClr val="bg2">
+                  <a:lumMod val="90000"/>
+                </a:schemeClr>
+              </a:solidFill>
+            </a:ln>
+          </p:spPr>
+          <p:style>
+            <a:lnRef idx="1">
+              <a:schemeClr val="accent1"/>
+            </a:lnRef>
+            <a:fillRef idx="0">
+              <a:schemeClr val="accent1"/>
+            </a:fillRef>
+            <a:effectRef idx="0">
+              <a:schemeClr val="accent1"/>
+            </a:effectRef>
+            <a:fontRef idx="minor">
+              <a:schemeClr val="tx1"/>
+            </a:fontRef>
+          </p:style>
+        </p:cxnSp>
+      </p:grpSp>
+      <p:sp>
+        <p:nvSpPr>
+          <p:cNvPr id="18" name="TextBox 17">
+            <a:extLst>
+              <a:ext uri="{FF2B5EF4-FFF2-40B4-BE49-F238E27FC236}">
+                <a16:creationId xmlns:a16="http://schemas.microsoft.com/office/drawing/2014/main" id="{73034CBF-FC27-4D6B-915A-4C6B62844F6D}"/>
+              </a:ext>
+            </a:extLst>
+          </p:cNvPr>
+          <p:cNvSpPr txBox="1"/>
+          <p:nvPr/>
+        </p:nvSpPr>
+        <p:spPr>
+          <a:xfrm>
+            <a:off x="2032870" y="1968588"/>
+            <a:ext cx="1736373" cy="276999"/>
+          </a:xfrm>
+          <a:prstGeom prst="rect">
+            <a:avLst/>
+          </a:prstGeom>
+          <a:noFill/>
+        </p:spPr>
+        <p:txBody>
+          <a:bodyPr wrap="none" rtlCol="0">
+            <a:spAutoFit/>
+          </a:bodyPr>
+          <a:lstStyle/>
+          <a:p>
+            <a:r>
+              <a:rPr lang="en-GB" sz="1200" dirty="0">
+                <a:latin typeface="Segoe Print" panose="02000600000000000000" pitchFamily="2" charset="0"/>
+              </a:rPr>
+              <a:t>var p = new PObj();</a:t>
+            </a:r>
+          </a:p>
+        </p:txBody>
+      </p:sp>
+      <p:sp>
+        <p:nvSpPr>
+          <p:cNvPr id="101" name="TextBox 100">
+            <a:extLst>
+              <a:ext uri="{FF2B5EF4-FFF2-40B4-BE49-F238E27FC236}">
+                <a16:creationId xmlns:a16="http://schemas.microsoft.com/office/drawing/2014/main" id="{167FC3B5-159E-487F-A9D3-820BBBE7A6DB}"/>
+              </a:ext>
+            </a:extLst>
+          </p:cNvPr>
+          <p:cNvSpPr txBox="1"/>
+          <p:nvPr/>
+        </p:nvSpPr>
+        <p:spPr>
+          <a:xfrm>
+            <a:off x="2100682" y="3032770"/>
+            <a:ext cx="1723549" cy="461665"/>
+          </a:xfrm>
+          <a:prstGeom prst="rect">
+            <a:avLst/>
+          </a:prstGeom>
+          <a:noFill/>
+        </p:spPr>
+        <p:txBody>
+          <a:bodyPr wrap="none" rtlCol="0">
+            <a:spAutoFit/>
+          </a:bodyPr>
+          <a:lstStyle/>
+          <a:p>
+            <a:r>
+              <a:rPr lang="en-GB" sz="1200" dirty="0">
+                <a:latin typeface="Segoe Print" panose="02000600000000000000" pitchFamily="2" charset="0"/>
+              </a:rPr>
+              <a:t>var x = new XObj();</a:t>
+            </a:r>
+          </a:p>
+          <a:p>
+            <a:r>
+              <a:rPr lang="en-GB" sz="1200" dirty="0">
+                <a:latin typeface="Segoe Print" panose="02000600000000000000" pitchFamily="2" charset="0"/>
+              </a:rPr>
+              <a:t>var y = new XObj();</a:t>
+            </a:r>
+          </a:p>
+        </p:txBody>
+      </p:sp>
+      <p:sp>
+        <p:nvSpPr>
+          <p:cNvPr id="21" name="TextBox 20">
+            <a:extLst>
+              <a:ext uri="{FF2B5EF4-FFF2-40B4-BE49-F238E27FC236}">
+                <a16:creationId xmlns:a16="http://schemas.microsoft.com/office/drawing/2014/main" id="{D4E8BC5E-FCA5-40B2-B2A1-B3B086875CED}"/>
+              </a:ext>
+            </a:extLst>
+          </p:cNvPr>
+          <p:cNvSpPr txBox="1"/>
+          <p:nvPr/>
+        </p:nvSpPr>
+        <p:spPr>
+          <a:xfrm>
+            <a:off x="8008601" y="1818548"/>
+            <a:ext cx="1681871" cy="577081"/>
+          </a:xfrm>
+          <a:prstGeom prst="rect">
+            <a:avLst/>
+          </a:prstGeom>
+          <a:noFill/>
+        </p:spPr>
+        <p:txBody>
+          <a:bodyPr wrap="none" rtlCol="0">
+            <a:spAutoFit/>
+          </a:bodyPr>
+          <a:lstStyle/>
+          <a:p>
+            <a:pPr marL="285750" indent="-285750">
+              <a:buFont typeface="Arial" panose="020B0604020202020204" pitchFamily="34" charset="0"/>
+              <a:buChar char="•"/>
+            </a:pPr>
+            <a:r>
+              <a:rPr lang="en-GB" sz="1050" dirty="0">
+                <a:latin typeface="Segoe UI" panose="020B0502040204020203" pitchFamily="34" charset="0"/>
+                <a:cs typeface="Segoe UI" panose="020B0502040204020203" pitchFamily="34" charset="0"/>
+              </a:rPr>
+              <a:t>Requires transaction</a:t>
+            </a:r>
+          </a:p>
+          <a:p>
+            <a:pPr marL="285750" indent="-285750">
+              <a:buFont typeface="Arial" panose="020B0604020202020204" pitchFamily="34" charset="0"/>
+              <a:buChar char="•"/>
+            </a:pPr>
+            <a:r>
+              <a:rPr lang="en-GB" sz="1050" dirty="0">
+                <a:latin typeface="Segoe UI" panose="020B0502040204020203" pitchFamily="34" charset="0"/>
+                <a:cs typeface="Segoe UI" panose="020B0502040204020203" pitchFamily="34" charset="0"/>
+              </a:rPr>
+              <a:t>Joins transaction</a:t>
+            </a:r>
+          </a:p>
+          <a:p>
+            <a:pPr marL="285750" indent="-285750">
+              <a:buFont typeface="Arial" panose="020B0604020202020204" pitchFamily="34" charset="0"/>
+              <a:buChar char="•"/>
+            </a:pPr>
+            <a:r>
+              <a:rPr lang="en-GB" sz="1050" dirty="0">
+                <a:latin typeface="Segoe UI" panose="020B0502040204020203" pitchFamily="34" charset="0"/>
+                <a:cs typeface="Segoe UI" panose="020B0502040204020203" pitchFamily="34" charset="0"/>
+              </a:rPr>
+              <a:t>Logs create action</a:t>
+            </a:r>
+          </a:p>
+        </p:txBody>
+      </p:sp>
+      <p:sp>
+        <p:nvSpPr>
+          <p:cNvPr id="104" name="TextBox 103">
+            <a:extLst>
+              <a:ext uri="{FF2B5EF4-FFF2-40B4-BE49-F238E27FC236}">
+                <a16:creationId xmlns:a16="http://schemas.microsoft.com/office/drawing/2014/main" id="{DCCE8490-A48F-4A96-A48D-340BBEEF1184}"/>
+              </a:ext>
+            </a:extLst>
+          </p:cNvPr>
+          <p:cNvSpPr txBox="1"/>
+          <p:nvPr/>
+        </p:nvSpPr>
+        <p:spPr>
+          <a:xfrm>
+            <a:off x="8008601" y="2985516"/>
+            <a:ext cx="1955985" cy="253916"/>
+          </a:xfrm>
+          <a:prstGeom prst="rect">
+            <a:avLst/>
+          </a:prstGeom>
+          <a:noFill/>
+        </p:spPr>
+        <p:txBody>
+          <a:bodyPr wrap="none" rtlCol="0">
+            <a:spAutoFit/>
+          </a:bodyPr>
+          <a:lstStyle/>
+          <a:p>
+            <a:pPr marL="285750" indent="-285750">
+              <a:buFont typeface="Arial" panose="020B0604020202020204" pitchFamily="34" charset="0"/>
+              <a:buChar char="•"/>
+            </a:pPr>
+            <a:r>
+              <a:rPr lang="en-GB" sz="1050" dirty="0">
+                <a:latin typeface="Segoe UI" panose="020B0502040204020203" pitchFamily="34" charset="0"/>
+                <a:cs typeface="Segoe UI" panose="020B0502040204020203" pitchFamily="34" charset="0"/>
+              </a:rPr>
+              <a:t>Doesn’t need transaction</a:t>
+            </a:r>
+          </a:p>
+        </p:txBody>
+      </p:sp>
+      <p:grpSp>
+        <p:nvGrpSpPr>
+          <p:cNvPr id="105" name="Group 104">
+            <a:extLst>
+              <a:ext uri="{FF2B5EF4-FFF2-40B4-BE49-F238E27FC236}">
+                <a16:creationId xmlns:a16="http://schemas.microsoft.com/office/drawing/2014/main" id="{95DA1353-5A9C-42B7-A882-236C23711625}"/>
+              </a:ext>
+            </a:extLst>
+          </p:cNvPr>
+          <p:cNvGrpSpPr/>
+          <p:nvPr/>
+        </p:nvGrpSpPr>
+        <p:grpSpPr>
+          <a:xfrm>
+            <a:off x="4202799" y="3867391"/>
+            <a:ext cx="602474" cy="611588"/>
+            <a:chOff x="6306410" y="2220835"/>
+            <a:chExt cx="602474" cy="611588"/>
+          </a:xfrm>
+        </p:grpSpPr>
+        <p:sp>
+          <p:nvSpPr>
+            <p:cNvPr id="106" name="Rectangle 105">
+              <a:extLst>
+                <a:ext uri="{FF2B5EF4-FFF2-40B4-BE49-F238E27FC236}">
+                  <a16:creationId xmlns:a16="http://schemas.microsoft.com/office/drawing/2014/main" id="{CEDA8545-2441-4325-B789-3173CE5747EE}"/>
+                </a:ext>
+              </a:extLst>
+            </p:cNvPr>
+            <p:cNvSpPr/>
+            <p:nvPr/>
+          </p:nvSpPr>
+          <p:spPr>
+            <a:xfrm>
+              <a:off x="6306410" y="2220835"/>
+              <a:ext cx="602474" cy="611588"/>
+            </a:xfrm>
+            <a:prstGeom prst="rect">
+              <a:avLst/>
+            </a:prstGeom>
+            <a:effectLst>
+              <a:innerShdw blurRad="63500" dist="50800" dir="8100000">
+                <a:prstClr val="black">
+                  <a:alpha val="50000"/>
+                </a:prstClr>
+              </a:innerShdw>
+            </a:effectLst>
+          </p:spPr>
+          <p:style>
+            <a:lnRef idx="2">
+              <a:schemeClr val="accent1"/>
+            </a:lnRef>
+            <a:fillRef idx="1">
+              <a:schemeClr val="lt1"/>
+            </a:fillRef>
+            <a:effectRef idx="0">
+              <a:schemeClr val="accent1"/>
+            </a:effectRef>
+            <a:fontRef idx="minor">
+              <a:schemeClr val="dk1"/>
+            </a:fontRef>
+          </p:style>
+          <p:txBody>
+            <a:bodyPr rot="0" spcFirstLastPara="0" vertOverflow="overflow" horzOverflow="overflow" vert="horz" wrap="square" lIns="91440" tIns="45720" rIns="91440" bIns="45720" numCol="1" spcCol="0" rtlCol="0" fromWordArt="0" anchor="ctr" anchorCtr="0" forceAA="0" compatLnSpc="1">
+              <a:prstTxWarp prst="textNoShape">
+                <a:avLst/>
+              </a:prstTxWarp>
+              <a:noAutofit/>
+            </a:bodyPr>
+            <a:lstStyle/>
+            <a:p>
+              <a:pPr algn="ctr"/>
+              <a:endParaRPr lang="en-GB" dirty="0">
+                <a:solidFill>
+                  <a:schemeClr val="dk1"/>
+                </a:solidFill>
+              </a:endParaRPr>
+            </a:p>
+          </p:txBody>
+        </p:sp>
+        <p:cxnSp>
+          <p:nvCxnSpPr>
+            <p:cNvPr id="107" name="Straight Connector 106">
+              <a:extLst>
+                <a:ext uri="{FF2B5EF4-FFF2-40B4-BE49-F238E27FC236}">
+                  <a16:creationId xmlns:a16="http://schemas.microsoft.com/office/drawing/2014/main" id="{22D80170-1E6F-49E7-A279-5E8FD4D7FCE6}"/>
+                </a:ext>
+              </a:extLst>
+            </p:cNvPr>
+            <p:cNvCxnSpPr>
+              <a:cxnSpLocks/>
+              <a:stCxn id="106" idx="0"/>
+              <a:endCxn id="106" idx="2"/>
+            </p:cNvCxnSpPr>
+            <p:nvPr/>
+          </p:nvCxnSpPr>
+          <p:spPr>
+            <a:xfrm>
+              <a:off x="6607647" y="2220835"/>
+              <a:ext cx="0" cy="611588"/>
+            </a:xfrm>
+            <a:prstGeom prst="line">
+              <a:avLst/>
+            </a:prstGeom>
+            <a:ln>
+              <a:solidFill>
+                <a:schemeClr val="bg2">
+                  <a:lumMod val="90000"/>
+                </a:schemeClr>
+              </a:solidFill>
+            </a:ln>
+          </p:spPr>
+          <p:style>
+            <a:lnRef idx="1">
+              <a:schemeClr val="accent1"/>
+            </a:lnRef>
+            <a:fillRef idx="0">
+              <a:schemeClr val="accent1"/>
+            </a:fillRef>
+            <a:effectRef idx="0">
+              <a:schemeClr val="accent1"/>
+            </a:effectRef>
+            <a:fontRef idx="minor">
+              <a:schemeClr val="tx1"/>
+            </a:fontRef>
+          </p:style>
+        </p:cxnSp>
+        <p:cxnSp>
+          <p:nvCxnSpPr>
+            <p:cNvPr id="108" name="Straight Connector 107">
+              <a:extLst>
+                <a:ext uri="{FF2B5EF4-FFF2-40B4-BE49-F238E27FC236}">
+                  <a16:creationId xmlns:a16="http://schemas.microsoft.com/office/drawing/2014/main" id="{22308905-9349-43C0-BB13-FE581D689F24}"/>
+                </a:ext>
+              </a:extLst>
+            </p:cNvPr>
+            <p:cNvCxnSpPr>
+              <a:cxnSpLocks/>
+              <a:stCxn id="106" idx="1"/>
+              <a:endCxn id="106" idx="3"/>
+            </p:cNvCxnSpPr>
+            <p:nvPr/>
+          </p:nvCxnSpPr>
+          <p:spPr>
+            <a:xfrm>
+              <a:off x="6306410" y="2526629"/>
+              <a:ext cx="602474" cy="0"/>
+            </a:xfrm>
+            <a:prstGeom prst="line">
+              <a:avLst/>
+            </a:prstGeom>
+            <a:ln>
+              <a:solidFill>
+                <a:schemeClr val="bg2">
+                  <a:lumMod val="90000"/>
+                </a:schemeClr>
+              </a:solidFill>
+            </a:ln>
+          </p:spPr>
+          <p:style>
+            <a:lnRef idx="1">
+              <a:schemeClr val="accent1"/>
+            </a:lnRef>
+            <a:fillRef idx="0">
+              <a:schemeClr val="accent1"/>
+            </a:fillRef>
+            <a:effectRef idx="0">
+              <a:schemeClr val="accent1"/>
+            </a:effectRef>
+            <a:fontRef idx="minor">
+              <a:schemeClr val="tx1"/>
+            </a:fontRef>
+          </p:style>
+        </p:cxnSp>
+      </p:grpSp>
+      <p:sp>
+        <p:nvSpPr>
+          <p:cNvPr id="109" name="TextBox 108">
+            <a:extLst>
+              <a:ext uri="{FF2B5EF4-FFF2-40B4-BE49-F238E27FC236}">
+                <a16:creationId xmlns:a16="http://schemas.microsoft.com/office/drawing/2014/main" id="{7DBDB739-14B9-48BC-9455-556ABFE2C90A}"/>
+              </a:ext>
+            </a:extLst>
+          </p:cNvPr>
+          <p:cNvSpPr txBox="1"/>
+          <p:nvPr/>
+        </p:nvSpPr>
+        <p:spPr>
+          <a:xfrm>
+            <a:off x="2100682" y="3835426"/>
+            <a:ext cx="928459" cy="646331"/>
+          </a:xfrm>
+          <a:prstGeom prst="rect">
+            <a:avLst/>
+          </a:prstGeom>
+          <a:noFill/>
+        </p:spPr>
+        <p:txBody>
+          <a:bodyPr wrap="none" rtlCol="0">
+            <a:spAutoFit/>
+          </a:bodyPr>
+          <a:lstStyle/>
+          <a:p>
+            <a:r>
+              <a:rPr lang="en-GB" sz="1200" dirty="0">
+                <a:latin typeface="Segoe Print" panose="02000600000000000000" pitchFamily="2" charset="0"/>
+              </a:rPr>
+              <a:t>x.A = 42;</a:t>
+            </a:r>
+          </a:p>
+          <a:p>
+            <a:r>
+              <a:rPr lang="en-GB" sz="1200" dirty="0">
+                <a:latin typeface="Segoe Print" panose="02000600000000000000" pitchFamily="2" charset="0"/>
+              </a:rPr>
+              <a:t>y.A = 21;</a:t>
+            </a:r>
+          </a:p>
+          <a:p>
+            <a:r>
+              <a:rPr lang="en-GB" sz="1200" dirty="0">
+                <a:latin typeface="Segoe Print" panose="02000600000000000000" pitchFamily="2" charset="0"/>
+              </a:rPr>
+              <a:t>x.X = y;</a:t>
+            </a:r>
+          </a:p>
+        </p:txBody>
+      </p:sp>
+      <p:sp>
+        <p:nvSpPr>
+          <p:cNvPr id="121" name="TextBox 120">
+            <a:extLst>
+              <a:ext uri="{FF2B5EF4-FFF2-40B4-BE49-F238E27FC236}">
+                <a16:creationId xmlns:a16="http://schemas.microsoft.com/office/drawing/2014/main" id="{C2527543-06C7-4DC5-8D62-C2D05CDEE022}"/>
+              </a:ext>
+            </a:extLst>
+          </p:cNvPr>
+          <p:cNvSpPr txBox="1"/>
+          <p:nvPr/>
+        </p:nvSpPr>
+        <p:spPr>
+          <a:xfrm>
+            <a:off x="7968162" y="3943355"/>
+            <a:ext cx="2056973" cy="415498"/>
+          </a:xfrm>
+          <a:prstGeom prst="rect">
+            <a:avLst/>
+          </a:prstGeom>
+          <a:noFill/>
+        </p:spPr>
+        <p:txBody>
+          <a:bodyPr wrap="none" rtlCol="0">
+            <a:spAutoFit/>
+          </a:bodyPr>
+          <a:lstStyle/>
+          <a:p>
+            <a:pPr marL="285750" indent="-285750">
+              <a:buFont typeface="Arial" panose="020B0604020202020204" pitchFamily="34" charset="0"/>
+              <a:buChar char="•"/>
+            </a:pPr>
+            <a:r>
+              <a:rPr lang="en-GB" sz="1050" dirty="0">
+                <a:latin typeface="Segoe UI" panose="020B0502040204020203" pitchFamily="34" charset="0"/>
+                <a:cs typeface="Segoe UI" panose="020B0502040204020203" pitchFamily="34" charset="0"/>
+              </a:rPr>
+              <a:t>Doesn’t need transaction</a:t>
+            </a:r>
+          </a:p>
+          <a:p>
+            <a:pPr marL="285750" indent="-285750">
+              <a:buFont typeface="Arial" panose="020B0604020202020204" pitchFamily="34" charset="0"/>
+              <a:buChar char="•"/>
+            </a:pPr>
+            <a:r>
+              <a:rPr lang="en-GB" sz="1050" dirty="0">
+                <a:latin typeface="Segoe UI" panose="020B0502040204020203" pitchFamily="34" charset="0"/>
+                <a:cs typeface="Segoe UI" panose="020B0502040204020203" pitchFamily="34" charset="0"/>
+              </a:rPr>
+              <a:t>Non-transactional updates</a:t>
+            </a:r>
+          </a:p>
+        </p:txBody>
+      </p:sp>
+      <p:sp>
+        <p:nvSpPr>
+          <p:cNvPr id="22" name="Oval 21">
+            <a:extLst>
+              <a:ext uri="{FF2B5EF4-FFF2-40B4-BE49-F238E27FC236}">
+                <a16:creationId xmlns:a16="http://schemas.microsoft.com/office/drawing/2014/main" id="{B67ACE9A-D4A3-4E84-9728-E75EA0333AC0}"/>
+              </a:ext>
+            </a:extLst>
+          </p:cNvPr>
+          <p:cNvSpPr/>
+          <p:nvPr/>
+        </p:nvSpPr>
+        <p:spPr>
+          <a:xfrm>
+            <a:off x="4595449" y="3969472"/>
+            <a:ext cx="101633" cy="101633"/>
+          </a:xfrm>
+          <a:prstGeom prst="ellipse">
+            <a:avLst/>
+          </a:prstGeom>
+        </p:spPr>
+        <p:style>
+          <a:lnRef idx="2">
+            <a:schemeClr val="accent1">
+              <a:shade val="50000"/>
+            </a:schemeClr>
+          </a:lnRef>
+          <a:fillRef idx="1">
+            <a:schemeClr val="accent1"/>
+          </a:fillRef>
+          <a:effectRef idx="0">
+            <a:schemeClr val="accent1"/>
+          </a:effectRef>
+          <a:fontRef idx="minor">
+            <a:schemeClr val="lt1"/>
+          </a:fontRef>
+        </p:style>
+        <p:txBody>
+          <a:bodyPr rtlCol="0" anchor="ctr"/>
+          <a:lstStyle/>
+          <a:p>
+            <a:pPr algn="ctr"/>
+            <a:endParaRPr lang="en-GB"/>
+          </a:p>
+        </p:txBody>
+      </p:sp>
+      <p:grpSp>
+        <p:nvGrpSpPr>
+          <p:cNvPr id="130" name="Group 129">
+            <a:extLst>
+              <a:ext uri="{FF2B5EF4-FFF2-40B4-BE49-F238E27FC236}">
+                <a16:creationId xmlns:a16="http://schemas.microsoft.com/office/drawing/2014/main" id="{F35630E5-AAEA-4947-B62B-8E6798CF6C43}"/>
+              </a:ext>
+            </a:extLst>
+          </p:cNvPr>
+          <p:cNvGrpSpPr/>
+          <p:nvPr/>
+        </p:nvGrpSpPr>
+        <p:grpSpPr>
+          <a:xfrm>
+            <a:off x="4198748" y="4899788"/>
+            <a:ext cx="710588" cy="710588"/>
+            <a:chOff x="4592272" y="1943858"/>
+            <a:chExt cx="710588" cy="710588"/>
+          </a:xfrm>
+        </p:grpSpPr>
+        <p:sp>
+          <p:nvSpPr>
+            <p:cNvPr id="132" name="Oval 131">
+              <a:extLst>
+                <a:ext uri="{FF2B5EF4-FFF2-40B4-BE49-F238E27FC236}">
+                  <a16:creationId xmlns:a16="http://schemas.microsoft.com/office/drawing/2014/main" id="{054E7D02-C240-4BD1-8325-362AC29CEDE3}"/>
+                </a:ext>
+              </a:extLst>
+            </p:cNvPr>
+            <p:cNvSpPr/>
+            <p:nvPr/>
+          </p:nvSpPr>
+          <p:spPr>
+            <a:xfrm>
+              <a:off x="4592272" y="1943858"/>
+              <a:ext cx="710588" cy="710588"/>
+            </a:xfrm>
+            <a:prstGeom prst="ellipse">
+              <a:avLst/>
+            </a:prstGeom>
+            <a:effectLst>
+              <a:innerShdw blurRad="63500" dist="50800" dir="8100000">
+                <a:prstClr val="black">
+                  <a:alpha val="50000"/>
+                </a:prstClr>
+              </a:innerShdw>
+            </a:effectLst>
+          </p:spPr>
+          <p:style>
+            <a:lnRef idx="2">
+              <a:schemeClr val="accent1"/>
+            </a:lnRef>
+            <a:fillRef idx="1">
+              <a:schemeClr val="lt1"/>
+            </a:fillRef>
+            <a:effectRef idx="0">
+              <a:schemeClr val="accent1"/>
+            </a:effectRef>
+            <a:fontRef idx="minor">
+              <a:schemeClr val="dk1"/>
+            </a:fontRef>
+          </p:style>
+          <p:txBody>
+            <a:bodyPr rtlCol="0" anchor="ctr"/>
+            <a:lstStyle/>
+            <a:p>
+              <a:pPr algn="ctr"/>
+              <a:endParaRPr lang="en-GB"/>
+            </a:p>
+          </p:txBody>
+        </p:sp>
+        <p:sp>
+          <p:nvSpPr>
+            <p:cNvPr id="133" name="Oval 132">
+              <a:extLst>
+                <a:ext uri="{FF2B5EF4-FFF2-40B4-BE49-F238E27FC236}">
+                  <a16:creationId xmlns:a16="http://schemas.microsoft.com/office/drawing/2014/main" id="{4D5E7A1A-FABF-4E34-8046-A13B2CB1437E}"/>
+                </a:ext>
+              </a:extLst>
+            </p:cNvPr>
+            <p:cNvSpPr/>
+            <p:nvPr/>
+          </p:nvSpPr>
+          <p:spPr>
+            <a:xfrm>
+              <a:off x="4836372" y="2187958"/>
+              <a:ext cx="224505" cy="224505"/>
+            </a:xfrm>
+            <a:prstGeom prst="ellipse">
+              <a:avLst/>
+            </a:prstGeom>
+            <a:effectLst>
+              <a:innerShdw blurRad="63500" dist="50800" dir="18900000">
+                <a:prstClr val="black">
+                  <a:alpha val="50000"/>
+                </a:prstClr>
+              </a:innerShdw>
+            </a:effectLst>
+          </p:spPr>
+          <p:style>
+            <a:lnRef idx="2">
+              <a:schemeClr val="accent1"/>
+            </a:lnRef>
+            <a:fillRef idx="1">
+              <a:schemeClr val="lt1"/>
+            </a:fillRef>
+            <a:effectRef idx="0">
+              <a:schemeClr val="accent1"/>
+            </a:effectRef>
+            <a:fontRef idx="minor">
+              <a:schemeClr val="dk1"/>
+            </a:fontRef>
+          </p:style>
+          <p:txBody>
+            <a:bodyPr rtlCol="0" anchor="ctr"/>
+            <a:lstStyle/>
+            <a:p>
+              <a:pPr algn="ctr"/>
+              <a:endParaRPr lang="en-GB"/>
+            </a:p>
+          </p:txBody>
+        </p:sp>
+        <p:cxnSp>
+          <p:nvCxnSpPr>
+            <p:cNvPr id="135" name="Straight Connector 134">
+              <a:extLst>
+                <a:ext uri="{FF2B5EF4-FFF2-40B4-BE49-F238E27FC236}">
+                  <a16:creationId xmlns:a16="http://schemas.microsoft.com/office/drawing/2014/main" id="{DC2C81DA-93A1-4ABE-9435-0AFA7159B2D3}"/>
+                </a:ext>
+              </a:extLst>
+            </p:cNvPr>
+            <p:cNvCxnSpPr>
+              <a:stCxn id="132" idx="0"/>
+              <a:endCxn id="133" idx="0"/>
+            </p:cNvCxnSpPr>
+            <p:nvPr/>
+          </p:nvCxnSpPr>
+          <p:spPr>
+            <a:xfrm>
+              <a:off x="4947566" y="1943858"/>
+              <a:ext cx="1058" cy="244100"/>
+            </a:xfrm>
+            <a:prstGeom prst="line">
+              <a:avLst/>
+            </a:prstGeom>
+            <a:ln>
+              <a:solidFill>
+                <a:schemeClr val="bg2">
+                  <a:lumMod val="90000"/>
+                </a:schemeClr>
+              </a:solidFill>
+            </a:ln>
+          </p:spPr>
+          <p:style>
+            <a:lnRef idx="1">
+              <a:schemeClr val="accent1"/>
+            </a:lnRef>
+            <a:fillRef idx="0">
+              <a:schemeClr val="accent1"/>
+            </a:fillRef>
+            <a:effectRef idx="0">
+              <a:schemeClr val="accent1"/>
+            </a:effectRef>
+            <a:fontRef idx="minor">
+              <a:schemeClr val="tx1"/>
+            </a:fontRef>
+          </p:style>
+        </p:cxnSp>
+        <p:cxnSp>
+          <p:nvCxnSpPr>
+            <p:cNvPr id="136" name="Straight Connector 135">
+              <a:extLst>
+                <a:ext uri="{FF2B5EF4-FFF2-40B4-BE49-F238E27FC236}">
+                  <a16:creationId xmlns:a16="http://schemas.microsoft.com/office/drawing/2014/main" id="{5E5DF521-9834-46CA-9EE5-AFEC90110325}"/>
+                </a:ext>
+              </a:extLst>
+            </p:cNvPr>
+            <p:cNvCxnSpPr>
+              <a:cxnSpLocks/>
+              <a:stCxn id="132" idx="7"/>
+              <a:endCxn id="133" idx="7"/>
+            </p:cNvCxnSpPr>
+            <p:nvPr/>
+          </p:nvCxnSpPr>
+          <p:spPr>
+            <a:xfrm flipH="1">
+              <a:off x="5027999" y="2047921"/>
+              <a:ext cx="170798" cy="172914"/>
+            </a:xfrm>
+            <a:prstGeom prst="line">
+              <a:avLst/>
+            </a:prstGeom>
+            <a:ln>
+              <a:solidFill>
+                <a:schemeClr val="bg2">
+                  <a:lumMod val="90000"/>
+                </a:schemeClr>
+              </a:solidFill>
+            </a:ln>
+          </p:spPr>
+          <p:style>
+            <a:lnRef idx="1">
+              <a:schemeClr val="accent1"/>
+            </a:lnRef>
+            <a:fillRef idx="0">
+              <a:schemeClr val="accent1"/>
+            </a:fillRef>
+            <a:effectRef idx="0">
+              <a:schemeClr val="accent1"/>
+            </a:effectRef>
+            <a:fontRef idx="minor">
+              <a:schemeClr val="tx1"/>
+            </a:fontRef>
+          </p:style>
+        </p:cxnSp>
+        <p:cxnSp>
+          <p:nvCxnSpPr>
+            <p:cNvPr id="137" name="Straight Connector 136">
+              <a:extLst>
+                <a:ext uri="{FF2B5EF4-FFF2-40B4-BE49-F238E27FC236}">
+                  <a16:creationId xmlns:a16="http://schemas.microsoft.com/office/drawing/2014/main" id="{E8B5F63E-AF6D-475B-B2AD-F2F385F064E3}"/>
+                </a:ext>
+              </a:extLst>
+            </p:cNvPr>
+            <p:cNvCxnSpPr>
+              <a:cxnSpLocks/>
+              <a:stCxn id="132" idx="6"/>
+              <a:endCxn id="133" idx="6"/>
+            </p:cNvCxnSpPr>
+            <p:nvPr/>
+          </p:nvCxnSpPr>
+          <p:spPr>
+            <a:xfrm flipH="1">
+              <a:off x="5060877" y="2299152"/>
+              <a:ext cx="241983" cy="1058"/>
+            </a:xfrm>
+            <a:prstGeom prst="line">
+              <a:avLst/>
+            </a:prstGeom>
+            <a:ln>
+              <a:solidFill>
+                <a:schemeClr val="bg2">
+                  <a:lumMod val="90000"/>
+                </a:schemeClr>
+              </a:solidFill>
+            </a:ln>
+          </p:spPr>
+          <p:style>
+            <a:lnRef idx="1">
+              <a:schemeClr val="accent1"/>
+            </a:lnRef>
+            <a:fillRef idx="0">
+              <a:schemeClr val="accent1"/>
+            </a:fillRef>
+            <a:effectRef idx="0">
+              <a:schemeClr val="accent1"/>
+            </a:effectRef>
+            <a:fontRef idx="minor">
+              <a:schemeClr val="tx1"/>
+            </a:fontRef>
+          </p:style>
+        </p:cxnSp>
+        <p:cxnSp>
+          <p:nvCxnSpPr>
+            <p:cNvPr id="139" name="Straight Connector 138">
+              <a:extLst>
+                <a:ext uri="{FF2B5EF4-FFF2-40B4-BE49-F238E27FC236}">
+                  <a16:creationId xmlns:a16="http://schemas.microsoft.com/office/drawing/2014/main" id="{59796503-77F5-42AB-B53A-F407D8BB6BB4}"/>
+                </a:ext>
+              </a:extLst>
+            </p:cNvPr>
+            <p:cNvCxnSpPr>
+              <a:cxnSpLocks/>
+              <a:stCxn id="133" idx="2"/>
+              <a:endCxn id="132" idx="2"/>
+            </p:cNvCxnSpPr>
+            <p:nvPr/>
+          </p:nvCxnSpPr>
+          <p:spPr>
+            <a:xfrm flipH="1" flipV="1">
+              <a:off x="4592272" y="2299152"/>
+              <a:ext cx="244100" cy="1058"/>
+            </a:xfrm>
+            <a:prstGeom prst="line">
+              <a:avLst/>
+            </a:prstGeom>
+            <a:ln>
+              <a:solidFill>
+                <a:schemeClr val="bg2">
+                  <a:lumMod val="90000"/>
+                </a:schemeClr>
+              </a:solidFill>
+            </a:ln>
+          </p:spPr>
+          <p:style>
+            <a:lnRef idx="1">
+              <a:schemeClr val="accent1"/>
+            </a:lnRef>
+            <a:fillRef idx="0">
+              <a:schemeClr val="accent1"/>
+            </a:fillRef>
+            <a:effectRef idx="0">
+              <a:schemeClr val="accent1"/>
+            </a:effectRef>
+            <a:fontRef idx="minor">
+              <a:schemeClr val="tx1"/>
+            </a:fontRef>
+          </p:style>
+        </p:cxnSp>
+        <p:cxnSp>
+          <p:nvCxnSpPr>
+            <p:cNvPr id="140" name="Straight Connector 139">
+              <a:extLst>
+                <a:ext uri="{FF2B5EF4-FFF2-40B4-BE49-F238E27FC236}">
+                  <a16:creationId xmlns:a16="http://schemas.microsoft.com/office/drawing/2014/main" id="{68284E00-8E88-4FB4-9BEA-51F72C56FD5C}"/>
+                </a:ext>
+              </a:extLst>
+            </p:cNvPr>
+            <p:cNvCxnSpPr>
+              <a:cxnSpLocks/>
+              <a:stCxn id="133" idx="1"/>
+              <a:endCxn id="132" idx="1"/>
+            </p:cNvCxnSpPr>
+            <p:nvPr/>
+          </p:nvCxnSpPr>
+          <p:spPr>
+            <a:xfrm flipH="1" flipV="1">
+              <a:off x="4696335" y="2047921"/>
+              <a:ext cx="172914" cy="172914"/>
+            </a:xfrm>
+            <a:prstGeom prst="line">
+              <a:avLst/>
+            </a:prstGeom>
+            <a:ln>
+              <a:solidFill>
+                <a:schemeClr val="bg2">
+                  <a:lumMod val="90000"/>
+                </a:schemeClr>
+              </a:solidFill>
+            </a:ln>
+          </p:spPr>
+          <p:style>
+            <a:lnRef idx="1">
+              <a:schemeClr val="accent1"/>
+            </a:lnRef>
+            <a:fillRef idx="0">
+              <a:schemeClr val="accent1"/>
+            </a:fillRef>
+            <a:effectRef idx="0">
+              <a:schemeClr val="accent1"/>
+            </a:effectRef>
+            <a:fontRef idx="minor">
+              <a:schemeClr val="tx1"/>
+            </a:fontRef>
+          </p:style>
+        </p:cxnSp>
+        <p:cxnSp>
+          <p:nvCxnSpPr>
+            <p:cNvPr id="141" name="Straight Connector 140">
+              <a:extLst>
+                <a:ext uri="{FF2B5EF4-FFF2-40B4-BE49-F238E27FC236}">
+                  <a16:creationId xmlns:a16="http://schemas.microsoft.com/office/drawing/2014/main" id="{20FB570A-4D72-4DEB-8199-A90C42684AFF}"/>
+                </a:ext>
+              </a:extLst>
+            </p:cNvPr>
+            <p:cNvCxnSpPr>
+              <a:cxnSpLocks/>
+              <a:stCxn id="132" idx="5"/>
+              <a:endCxn id="133" idx="5"/>
+            </p:cNvCxnSpPr>
+            <p:nvPr/>
+          </p:nvCxnSpPr>
+          <p:spPr>
+            <a:xfrm flipH="1" flipV="1">
+              <a:off x="5027999" y="2379585"/>
+              <a:ext cx="170798" cy="170798"/>
+            </a:xfrm>
+            <a:prstGeom prst="line">
+              <a:avLst/>
+            </a:prstGeom>
+            <a:ln>
+              <a:solidFill>
+                <a:schemeClr val="bg2">
+                  <a:lumMod val="90000"/>
+                </a:schemeClr>
+              </a:solidFill>
+            </a:ln>
+          </p:spPr>
+          <p:style>
+            <a:lnRef idx="1">
+              <a:schemeClr val="accent1"/>
+            </a:lnRef>
+            <a:fillRef idx="0">
+              <a:schemeClr val="accent1"/>
+            </a:fillRef>
+            <a:effectRef idx="0">
+              <a:schemeClr val="accent1"/>
+            </a:effectRef>
+            <a:fontRef idx="minor">
+              <a:schemeClr val="tx1"/>
+            </a:fontRef>
+          </p:style>
+        </p:cxnSp>
+        <p:cxnSp>
+          <p:nvCxnSpPr>
+            <p:cNvPr id="142" name="Straight Connector 141">
+              <a:extLst>
+                <a:ext uri="{FF2B5EF4-FFF2-40B4-BE49-F238E27FC236}">
+                  <a16:creationId xmlns:a16="http://schemas.microsoft.com/office/drawing/2014/main" id="{5BED10DB-C646-4977-97AB-A263301587E3}"/>
+                </a:ext>
+              </a:extLst>
+            </p:cNvPr>
+            <p:cNvCxnSpPr>
+              <a:cxnSpLocks/>
+              <a:stCxn id="132" idx="4"/>
+              <a:endCxn id="133" idx="4"/>
+            </p:cNvCxnSpPr>
+            <p:nvPr/>
+          </p:nvCxnSpPr>
+          <p:spPr>
+            <a:xfrm flipV="1">
+              <a:off x="4947566" y="2412463"/>
+              <a:ext cx="1058" cy="241983"/>
+            </a:xfrm>
+            <a:prstGeom prst="line">
+              <a:avLst/>
+            </a:prstGeom>
+            <a:ln>
+              <a:solidFill>
+                <a:schemeClr val="bg2">
+                  <a:lumMod val="90000"/>
+                </a:schemeClr>
+              </a:solidFill>
+            </a:ln>
+          </p:spPr>
+          <p:style>
+            <a:lnRef idx="1">
+              <a:schemeClr val="accent1"/>
+            </a:lnRef>
+            <a:fillRef idx="0">
+              <a:schemeClr val="accent1"/>
+            </a:fillRef>
+            <a:effectRef idx="0">
+              <a:schemeClr val="accent1"/>
+            </a:effectRef>
+            <a:fontRef idx="minor">
+              <a:schemeClr val="tx1"/>
+            </a:fontRef>
+          </p:style>
+        </p:cxnSp>
+        <p:cxnSp>
+          <p:nvCxnSpPr>
+            <p:cNvPr id="143" name="Straight Connector 142">
+              <a:extLst>
+                <a:ext uri="{FF2B5EF4-FFF2-40B4-BE49-F238E27FC236}">
+                  <a16:creationId xmlns:a16="http://schemas.microsoft.com/office/drawing/2014/main" id="{29416631-64CB-42F8-9778-220CDBF16E04}"/>
+                </a:ext>
+              </a:extLst>
+            </p:cNvPr>
+            <p:cNvCxnSpPr>
+              <a:cxnSpLocks/>
+              <a:stCxn id="132" idx="3"/>
+              <a:endCxn id="133" idx="3"/>
+            </p:cNvCxnSpPr>
+            <p:nvPr/>
+          </p:nvCxnSpPr>
+          <p:spPr>
+            <a:xfrm flipV="1">
+              <a:off x="4696335" y="2379585"/>
+              <a:ext cx="172914" cy="170798"/>
+            </a:xfrm>
+            <a:prstGeom prst="line">
+              <a:avLst/>
+            </a:prstGeom>
+            <a:ln>
+              <a:solidFill>
+                <a:schemeClr val="bg2">
+                  <a:lumMod val="90000"/>
+                </a:schemeClr>
+              </a:solidFill>
+            </a:ln>
+          </p:spPr>
+          <p:style>
+            <a:lnRef idx="1">
+              <a:schemeClr val="accent1"/>
+            </a:lnRef>
+            <a:fillRef idx="0">
+              <a:schemeClr val="accent1"/>
+            </a:fillRef>
+            <a:effectRef idx="0">
+              <a:schemeClr val="accent1"/>
+            </a:effectRef>
+            <a:fontRef idx="minor">
+              <a:schemeClr val="tx1"/>
+            </a:fontRef>
+          </p:style>
+        </p:cxnSp>
+      </p:grpSp>
+      <p:sp>
+        <p:nvSpPr>
+          <p:cNvPr id="144" name="Oval 143">
+            <a:extLst>
+              <a:ext uri="{FF2B5EF4-FFF2-40B4-BE49-F238E27FC236}">
+                <a16:creationId xmlns:a16="http://schemas.microsoft.com/office/drawing/2014/main" id="{FEFED538-B9DB-4C94-92CF-780AD9E075CF}"/>
+              </a:ext>
+            </a:extLst>
+          </p:cNvPr>
+          <p:cNvSpPr/>
+          <p:nvPr/>
+        </p:nvSpPr>
+        <p:spPr>
+          <a:xfrm>
+            <a:off x="4738927" y="5129819"/>
+            <a:ext cx="101633" cy="101633"/>
+          </a:xfrm>
+          <a:prstGeom prst="ellipse">
+            <a:avLst/>
+          </a:prstGeom>
+        </p:spPr>
+        <p:style>
+          <a:lnRef idx="2">
+            <a:schemeClr val="accent1">
+              <a:shade val="50000"/>
+            </a:schemeClr>
+          </a:lnRef>
+          <a:fillRef idx="1">
+            <a:schemeClr val="accent1"/>
+          </a:fillRef>
+          <a:effectRef idx="0">
+            <a:schemeClr val="accent1"/>
+          </a:effectRef>
+          <a:fontRef idx="minor">
+            <a:schemeClr val="lt1"/>
+          </a:fontRef>
+        </p:style>
+        <p:txBody>
+          <a:bodyPr rtlCol="0" anchor="ctr"/>
+          <a:lstStyle/>
+          <a:p>
+            <a:pPr algn="ctr"/>
+            <a:endParaRPr lang="en-GB"/>
+          </a:p>
+        </p:txBody>
+      </p:sp>
+      <p:sp>
+        <p:nvSpPr>
+          <p:cNvPr id="145" name="TextBox 144">
+            <a:extLst>
+              <a:ext uri="{FF2B5EF4-FFF2-40B4-BE49-F238E27FC236}">
+                <a16:creationId xmlns:a16="http://schemas.microsoft.com/office/drawing/2014/main" id="{46187140-1E9B-42E3-AC1F-EBCB21A86F60}"/>
+              </a:ext>
+            </a:extLst>
+          </p:cNvPr>
+          <p:cNvSpPr txBox="1"/>
+          <p:nvPr/>
+        </p:nvSpPr>
+        <p:spPr>
+          <a:xfrm>
+            <a:off x="2100682" y="5092952"/>
+            <a:ext cx="848309" cy="276999"/>
+          </a:xfrm>
+          <a:prstGeom prst="rect">
+            <a:avLst/>
+          </a:prstGeom>
+          <a:noFill/>
+        </p:spPr>
+        <p:txBody>
+          <a:bodyPr wrap="none" rtlCol="0">
+            <a:spAutoFit/>
+          </a:bodyPr>
+          <a:lstStyle/>
+          <a:p>
+            <a:r>
+              <a:rPr lang="en-GB" sz="1200" dirty="0">
+                <a:latin typeface="Segoe Print" panose="02000600000000000000" pitchFamily="2" charset="0"/>
+              </a:rPr>
+              <a:t>p. X = x;</a:t>
+            </a:r>
+          </a:p>
+        </p:txBody>
+      </p:sp>
+      <p:sp>
+        <p:nvSpPr>
+          <p:cNvPr id="152" name="TextBox 151">
+            <a:extLst>
+              <a:ext uri="{FF2B5EF4-FFF2-40B4-BE49-F238E27FC236}">
+                <a16:creationId xmlns:a16="http://schemas.microsoft.com/office/drawing/2014/main" id="{8BF382E1-DA0E-4D7B-B229-D01478AD3203}"/>
+              </a:ext>
+            </a:extLst>
+          </p:cNvPr>
+          <p:cNvSpPr txBox="1"/>
+          <p:nvPr/>
+        </p:nvSpPr>
+        <p:spPr>
+          <a:xfrm>
+            <a:off x="7974251" y="4899429"/>
+            <a:ext cx="1903085" cy="738664"/>
+          </a:xfrm>
+          <a:prstGeom prst="rect">
+            <a:avLst/>
+          </a:prstGeom>
+          <a:noFill/>
+        </p:spPr>
+        <p:txBody>
+          <a:bodyPr wrap="none" rtlCol="0">
+            <a:spAutoFit/>
+          </a:bodyPr>
+          <a:lstStyle/>
+          <a:p>
+            <a:pPr marL="285750" indent="-285750">
+              <a:buFont typeface="Arial" panose="020B0604020202020204" pitchFamily="34" charset="0"/>
+              <a:buChar char="•"/>
+            </a:pPr>
+            <a:r>
+              <a:rPr lang="en-GB" sz="1050" dirty="0">
+                <a:latin typeface="Segoe UI" panose="020B0502040204020203" pitchFamily="34" charset="0"/>
+                <a:cs typeface="Segoe UI" panose="020B0502040204020203" pitchFamily="34" charset="0"/>
+              </a:rPr>
+              <a:t>Requires transaction</a:t>
+            </a:r>
+          </a:p>
+          <a:p>
+            <a:pPr marL="285750" indent="-285750">
+              <a:buFont typeface="Arial" panose="020B0604020202020204" pitchFamily="34" charset="0"/>
+              <a:buChar char="•"/>
+            </a:pPr>
+            <a:r>
+              <a:rPr lang="en-GB" sz="1050" dirty="0">
+                <a:latin typeface="Segoe UI" panose="020B0502040204020203" pitchFamily="34" charset="0"/>
+                <a:cs typeface="Segoe UI" panose="020B0502040204020203" pitchFamily="34" charset="0"/>
+              </a:rPr>
+              <a:t>x joins transaction</a:t>
+            </a:r>
+          </a:p>
+          <a:p>
+            <a:pPr marL="285750" indent="-285750">
+              <a:buFont typeface="Arial" panose="020B0604020202020204" pitchFamily="34" charset="0"/>
+              <a:buChar char="•"/>
+            </a:pPr>
+            <a:r>
+              <a:rPr lang="en-GB" sz="1050" dirty="0">
+                <a:latin typeface="Segoe UI" panose="020B0502040204020203" pitchFamily="34" charset="0"/>
+                <a:cs typeface="Segoe UI" panose="020B0502040204020203" pitchFamily="34" charset="0"/>
+              </a:rPr>
+              <a:t>y joins transaction</a:t>
+            </a:r>
+          </a:p>
+          <a:p>
+            <a:pPr marL="285750" indent="-285750">
+              <a:buFont typeface="Arial" panose="020B0604020202020204" pitchFamily="34" charset="0"/>
+              <a:buChar char="•"/>
+            </a:pPr>
+            <a:r>
+              <a:rPr lang="en-GB" sz="1050" dirty="0">
+                <a:latin typeface="Segoe UI" panose="020B0502040204020203" pitchFamily="34" charset="0"/>
+                <a:cs typeface="Segoe UI" panose="020B0502040204020203" pitchFamily="34" charset="0"/>
+              </a:rPr>
+              <a:t>p logs update operation</a:t>
+            </a:r>
+          </a:p>
+        </p:txBody>
+      </p:sp>
+      <p:grpSp>
+        <p:nvGrpSpPr>
+          <p:cNvPr id="49" name="Group 48">
+            <a:extLst>
+              <a:ext uri="{FF2B5EF4-FFF2-40B4-BE49-F238E27FC236}">
+                <a16:creationId xmlns:a16="http://schemas.microsoft.com/office/drawing/2014/main" id="{6C9BDA48-642C-49D7-89CA-C768ABE0FD71}"/>
+              </a:ext>
+            </a:extLst>
+          </p:cNvPr>
+          <p:cNvGrpSpPr/>
+          <p:nvPr/>
+        </p:nvGrpSpPr>
+        <p:grpSpPr>
+          <a:xfrm>
+            <a:off x="5578882" y="2826125"/>
+            <a:ext cx="602474" cy="611588"/>
+            <a:chOff x="6306410" y="2220835"/>
+            <a:chExt cx="602474" cy="611588"/>
+          </a:xfrm>
+        </p:grpSpPr>
+        <p:sp>
+          <p:nvSpPr>
+            <p:cNvPr id="50" name="Rectangle 49">
+              <a:extLst>
+                <a:ext uri="{FF2B5EF4-FFF2-40B4-BE49-F238E27FC236}">
+                  <a16:creationId xmlns:a16="http://schemas.microsoft.com/office/drawing/2014/main" id="{E030D384-1D48-4901-B88B-B5FEBA5DDC21}"/>
+                </a:ext>
+              </a:extLst>
+            </p:cNvPr>
+            <p:cNvSpPr/>
+            <p:nvPr/>
+          </p:nvSpPr>
+          <p:spPr>
+            <a:xfrm>
+              <a:off x="6306410" y="2220835"/>
+              <a:ext cx="602474" cy="611588"/>
+            </a:xfrm>
+            <a:prstGeom prst="rect">
+              <a:avLst/>
+            </a:prstGeom>
+            <a:effectLst>
+              <a:innerShdw blurRad="63500" dist="50800" dir="8100000">
+                <a:prstClr val="black">
+                  <a:alpha val="50000"/>
+                </a:prstClr>
+              </a:innerShdw>
+            </a:effectLst>
+          </p:spPr>
+          <p:style>
+            <a:lnRef idx="2">
+              <a:schemeClr val="accent1"/>
+            </a:lnRef>
+            <a:fillRef idx="1">
+              <a:schemeClr val="lt1"/>
+            </a:fillRef>
+            <a:effectRef idx="0">
+              <a:schemeClr val="accent1"/>
+            </a:effectRef>
+            <a:fontRef idx="minor">
+              <a:schemeClr val="dk1"/>
+            </a:fontRef>
+          </p:style>
+          <p:txBody>
+            <a:bodyPr rot="0" spcFirstLastPara="0" vertOverflow="overflow" horzOverflow="overflow" vert="horz" wrap="square" lIns="91440" tIns="45720" rIns="91440" bIns="45720" numCol="1" spcCol="0" rtlCol="0" fromWordArt="0" anchor="ctr" anchorCtr="0" forceAA="0" compatLnSpc="1">
+              <a:prstTxWarp prst="textNoShape">
+                <a:avLst/>
+              </a:prstTxWarp>
+              <a:noAutofit/>
+            </a:bodyPr>
+            <a:lstStyle/>
+            <a:p>
+              <a:pPr algn="ctr"/>
+              <a:endParaRPr lang="en-GB" dirty="0">
+                <a:solidFill>
+                  <a:schemeClr val="dk1"/>
+                </a:solidFill>
+              </a:endParaRPr>
+            </a:p>
+          </p:txBody>
+        </p:sp>
+        <p:cxnSp>
+          <p:nvCxnSpPr>
+            <p:cNvPr id="51" name="Straight Connector 50">
+              <a:extLst>
+                <a:ext uri="{FF2B5EF4-FFF2-40B4-BE49-F238E27FC236}">
+                  <a16:creationId xmlns:a16="http://schemas.microsoft.com/office/drawing/2014/main" id="{E962EAD8-0E51-4E47-AC60-4C824AE2DA45}"/>
+                </a:ext>
+              </a:extLst>
+            </p:cNvPr>
+            <p:cNvCxnSpPr>
+              <a:cxnSpLocks/>
+              <a:stCxn id="50" idx="0"/>
+              <a:endCxn id="50" idx="2"/>
+            </p:cNvCxnSpPr>
+            <p:nvPr/>
+          </p:nvCxnSpPr>
+          <p:spPr>
+            <a:xfrm>
+              <a:off x="6607647" y="2220835"/>
+              <a:ext cx="0" cy="611588"/>
+            </a:xfrm>
+            <a:prstGeom prst="line">
+              <a:avLst/>
+            </a:prstGeom>
+            <a:ln>
+              <a:solidFill>
+                <a:schemeClr val="bg2">
+                  <a:lumMod val="90000"/>
+                </a:schemeClr>
+              </a:solidFill>
+            </a:ln>
+          </p:spPr>
+          <p:style>
+            <a:lnRef idx="1">
+              <a:schemeClr val="accent1"/>
+            </a:lnRef>
+            <a:fillRef idx="0">
+              <a:schemeClr val="accent1"/>
+            </a:fillRef>
+            <a:effectRef idx="0">
+              <a:schemeClr val="accent1"/>
+            </a:effectRef>
+            <a:fontRef idx="minor">
+              <a:schemeClr val="tx1"/>
+            </a:fontRef>
+          </p:style>
+        </p:cxnSp>
+        <p:cxnSp>
+          <p:nvCxnSpPr>
+            <p:cNvPr id="52" name="Straight Connector 51">
+              <a:extLst>
+                <a:ext uri="{FF2B5EF4-FFF2-40B4-BE49-F238E27FC236}">
+                  <a16:creationId xmlns:a16="http://schemas.microsoft.com/office/drawing/2014/main" id="{C195BF58-EDF4-4231-83D3-312FE1256320}"/>
+                </a:ext>
+              </a:extLst>
+            </p:cNvPr>
+            <p:cNvCxnSpPr>
+              <a:cxnSpLocks/>
+              <a:stCxn id="50" idx="1"/>
+              <a:endCxn id="50" idx="3"/>
+            </p:cNvCxnSpPr>
+            <p:nvPr/>
+          </p:nvCxnSpPr>
+          <p:spPr>
+            <a:xfrm>
+              <a:off x="6306410" y="2526629"/>
+              <a:ext cx="602474" cy="0"/>
+            </a:xfrm>
+            <a:prstGeom prst="line">
+              <a:avLst/>
+            </a:prstGeom>
+            <a:ln>
+              <a:solidFill>
+                <a:schemeClr val="bg2">
+                  <a:lumMod val="90000"/>
+                </a:schemeClr>
+              </a:solidFill>
+            </a:ln>
+          </p:spPr>
+          <p:style>
+            <a:lnRef idx="1">
+              <a:schemeClr val="accent1"/>
+            </a:lnRef>
+            <a:fillRef idx="0">
+              <a:schemeClr val="accent1"/>
+            </a:fillRef>
+            <a:effectRef idx="0">
+              <a:schemeClr val="accent1"/>
+            </a:effectRef>
+            <a:fontRef idx="minor">
+              <a:schemeClr val="tx1"/>
+            </a:fontRef>
+          </p:style>
+        </p:cxnSp>
+      </p:grpSp>
+      <p:grpSp>
+        <p:nvGrpSpPr>
+          <p:cNvPr id="53" name="Group 52">
+            <a:extLst>
+              <a:ext uri="{FF2B5EF4-FFF2-40B4-BE49-F238E27FC236}">
+                <a16:creationId xmlns:a16="http://schemas.microsoft.com/office/drawing/2014/main" id="{0A458312-6C4A-403A-9D52-DCAEA2E725D3}"/>
+              </a:ext>
+            </a:extLst>
+          </p:cNvPr>
+          <p:cNvGrpSpPr/>
+          <p:nvPr/>
+        </p:nvGrpSpPr>
+        <p:grpSpPr>
+          <a:xfrm>
+            <a:off x="5565376" y="3866441"/>
+            <a:ext cx="602474" cy="611588"/>
+            <a:chOff x="6306410" y="2220835"/>
+            <a:chExt cx="602474" cy="611588"/>
+          </a:xfrm>
+        </p:grpSpPr>
+        <p:sp>
+          <p:nvSpPr>
+            <p:cNvPr id="54" name="Rectangle 53">
+              <a:extLst>
+                <a:ext uri="{FF2B5EF4-FFF2-40B4-BE49-F238E27FC236}">
+                  <a16:creationId xmlns:a16="http://schemas.microsoft.com/office/drawing/2014/main" id="{79C1D3C0-A37D-4DE9-BE5D-FA995214A4F0}"/>
+                </a:ext>
+              </a:extLst>
+            </p:cNvPr>
+            <p:cNvSpPr/>
+            <p:nvPr/>
+          </p:nvSpPr>
+          <p:spPr>
+            <a:xfrm>
+              <a:off x="6306410" y="2220835"/>
+              <a:ext cx="602474" cy="611588"/>
+            </a:xfrm>
+            <a:prstGeom prst="rect">
+              <a:avLst/>
+            </a:prstGeom>
+            <a:effectLst>
+              <a:innerShdw blurRad="63500" dist="50800" dir="8100000">
+                <a:prstClr val="black">
+                  <a:alpha val="50000"/>
+                </a:prstClr>
+              </a:innerShdw>
+            </a:effectLst>
+          </p:spPr>
+          <p:style>
+            <a:lnRef idx="2">
+              <a:schemeClr val="accent1"/>
+            </a:lnRef>
+            <a:fillRef idx="1">
+              <a:schemeClr val="lt1"/>
+            </a:fillRef>
+            <a:effectRef idx="0">
+              <a:schemeClr val="accent1"/>
+            </a:effectRef>
+            <a:fontRef idx="minor">
+              <a:schemeClr val="dk1"/>
+            </a:fontRef>
+          </p:style>
+          <p:txBody>
+            <a:bodyPr rot="0" spcFirstLastPara="0" vertOverflow="overflow" horzOverflow="overflow" vert="horz" wrap="square" lIns="91440" tIns="45720" rIns="91440" bIns="45720" numCol="1" spcCol="0" rtlCol="0" fromWordArt="0" anchor="ctr" anchorCtr="0" forceAA="0" compatLnSpc="1">
+              <a:prstTxWarp prst="textNoShape">
+                <a:avLst/>
+              </a:prstTxWarp>
+              <a:noAutofit/>
+            </a:bodyPr>
+            <a:lstStyle/>
+            <a:p>
+              <a:pPr algn="ctr"/>
+              <a:endParaRPr lang="en-GB" dirty="0">
+                <a:solidFill>
+                  <a:schemeClr val="dk1"/>
+                </a:solidFill>
+              </a:endParaRPr>
+            </a:p>
+          </p:txBody>
+        </p:sp>
+        <p:cxnSp>
+          <p:nvCxnSpPr>
+            <p:cNvPr id="55" name="Straight Connector 54">
+              <a:extLst>
+                <a:ext uri="{FF2B5EF4-FFF2-40B4-BE49-F238E27FC236}">
+                  <a16:creationId xmlns:a16="http://schemas.microsoft.com/office/drawing/2014/main" id="{FAB5935A-D24B-4499-B861-425FFC071791}"/>
+                </a:ext>
+              </a:extLst>
+            </p:cNvPr>
+            <p:cNvCxnSpPr>
+              <a:cxnSpLocks/>
+              <a:stCxn id="54" idx="0"/>
+              <a:endCxn id="54" idx="2"/>
+            </p:cNvCxnSpPr>
+            <p:nvPr/>
+          </p:nvCxnSpPr>
+          <p:spPr>
+            <a:xfrm>
+              <a:off x="6607647" y="2220835"/>
+              <a:ext cx="0" cy="611588"/>
+            </a:xfrm>
+            <a:prstGeom prst="line">
+              <a:avLst/>
+            </a:prstGeom>
+            <a:ln>
+              <a:solidFill>
+                <a:schemeClr val="bg2">
+                  <a:lumMod val="90000"/>
+                </a:schemeClr>
+              </a:solidFill>
+            </a:ln>
+          </p:spPr>
+          <p:style>
+            <a:lnRef idx="1">
+              <a:schemeClr val="accent1"/>
+            </a:lnRef>
+            <a:fillRef idx="0">
+              <a:schemeClr val="accent1"/>
+            </a:fillRef>
+            <a:effectRef idx="0">
+              <a:schemeClr val="accent1"/>
+            </a:effectRef>
+            <a:fontRef idx="minor">
+              <a:schemeClr val="tx1"/>
+            </a:fontRef>
+          </p:style>
+        </p:cxnSp>
+        <p:cxnSp>
+          <p:nvCxnSpPr>
+            <p:cNvPr id="56" name="Straight Connector 55">
+              <a:extLst>
+                <a:ext uri="{FF2B5EF4-FFF2-40B4-BE49-F238E27FC236}">
+                  <a16:creationId xmlns:a16="http://schemas.microsoft.com/office/drawing/2014/main" id="{824C6882-F49D-4B62-B315-7B8E539CA690}"/>
+                </a:ext>
+              </a:extLst>
+            </p:cNvPr>
+            <p:cNvCxnSpPr>
+              <a:cxnSpLocks/>
+              <a:stCxn id="54" idx="1"/>
+              <a:endCxn id="54" idx="3"/>
+            </p:cNvCxnSpPr>
+            <p:nvPr/>
+          </p:nvCxnSpPr>
+          <p:spPr>
+            <a:xfrm>
+              <a:off x="6306410" y="2526629"/>
+              <a:ext cx="602474" cy="0"/>
+            </a:xfrm>
+            <a:prstGeom prst="line">
+              <a:avLst/>
+            </a:prstGeom>
+            <a:ln>
+              <a:solidFill>
+                <a:schemeClr val="bg2">
+                  <a:lumMod val="90000"/>
+                </a:schemeClr>
+              </a:solidFill>
+            </a:ln>
+          </p:spPr>
+          <p:style>
+            <a:lnRef idx="1">
+              <a:schemeClr val="accent1"/>
+            </a:lnRef>
+            <a:fillRef idx="0">
+              <a:schemeClr val="accent1"/>
+            </a:fillRef>
+            <a:effectRef idx="0">
+              <a:schemeClr val="accent1"/>
+            </a:effectRef>
+            <a:fontRef idx="minor">
+              <a:schemeClr val="tx1"/>
+            </a:fontRef>
+          </p:style>
+        </p:cxnSp>
+      </p:grpSp>
+      <p:sp>
+        <p:nvSpPr>
+          <p:cNvPr id="57" name="Oval 56">
+            <a:extLst>
+              <a:ext uri="{FF2B5EF4-FFF2-40B4-BE49-F238E27FC236}">
+                <a16:creationId xmlns:a16="http://schemas.microsoft.com/office/drawing/2014/main" id="{4CAAB49C-AD73-4565-8183-21F49EF0C3F9}"/>
+              </a:ext>
+            </a:extLst>
+          </p:cNvPr>
+          <p:cNvSpPr/>
+          <p:nvPr/>
+        </p:nvSpPr>
+        <p:spPr>
+          <a:xfrm>
+            <a:off x="5964352" y="4245550"/>
+            <a:ext cx="101633" cy="101633"/>
+          </a:xfrm>
+          <a:prstGeom prst="ellipse">
+            <a:avLst/>
+          </a:prstGeom>
+        </p:spPr>
+        <p:style>
+          <a:lnRef idx="2">
+            <a:schemeClr val="accent1">
+              <a:shade val="50000"/>
+            </a:schemeClr>
+          </a:lnRef>
+          <a:fillRef idx="1">
+            <a:schemeClr val="accent1"/>
+          </a:fillRef>
+          <a:effectRef idx="0">
+            <a:schemeClr val="accent1"/>
+          </a:effectRef>
+          <a:fontRef idx="minor">
+            <a:schemeClr val="lt1"/>
+          </a:fontRef>
+        </p:style>
+        <p:txBody>
+          <a:bodyPr rtlCol="0" anchor="ctr"/>
+          <a:lstStyle/>
+          <a:p>
+            <a:pPr algn="ctr"/>
+            <a:endParaRPr lang="en-GB"/>
+          </a:p>
+        </p:txBody>
+      </p:sp>
+      <p:sp>
+        <p:nvSpPr>
+          <p:cNvPr id="58" name="Oval 57">
+            <a:extLst>
+              <a:ext uri="{FF2B5EF4-FFF2-40B4-BE49-F238E27FC236}">
+                <a16:creationId xmlns:a16="http://schemas.microsoft.com/office/drawing/2014/main" id="{3F9F0817-58AB-4CB5-B5A9-6E8F9A032957}"/>
+              </a:ext>
+            </a:extLst>
+          </p:cNvPr>
+          <p:cNvSpPr/>
+          <p:nvPr/>
+        </p:nvSpPr>
+        <p:spPr>
+          <a:xfrm>
+            <a:off x="4603838" y="4281119"/>
+            <a:ext cx="101633" cy="101633"/>
+          </a:xfrm>
+          <a:prstGeom prst="ellipse">
+            <a:avLst/>
+          </a:prstGeom>
+        </p:spPr>
+        <p:style>
+          <a:lnRef idx="2">
+            <a:schemeClr val="accent1">
+              <a:shade val="50000"/>
+            </a:schemeClr>
+          </a:lnRef>
+          <a:fillRef idx="1">
+            <a:schemeClr val="accent1"/>
+          </a:fillRef>
+          <a:effectRef idx="0">
+            <a:schemeClr val="accent1"/>
+          </a:effectRef>
+          <a:fontRef idx="minor">
+            <a:schemeClr val="lt1"/>
+          </a:fontRef>
+        </p:style>
+        <p:txBody>
+          <a:bodyPr rtlCol="0" anchor="ctr"/>
+          <a:lstStyle/>
+          <a:p>
+            <a:pPr algn="ctr"/>
+            <a:endParaRPr lang="en-GB"/>
+          </a:p>
+        </p:txBody>
+      </p:sp>
+      <p:cxnSp>
+        <p:nvCxnSpPr>
+          <p:cNvPr id="59" name="Connector: Elbow 121">
+            <a:extLst>
+              <a:ext uri="{FF2B5EF4-FFF2-40B4-BE49-F238E27FC236}">
+                <a16:creationId xmlns:a16="http://schemas.microsoft.com/office/drawing/2014/main" id="{BF9B09AF-B403-4891-B508-3F9BF8903DE6}"/>
+              </a:ext>
+            </a:extLst>
+          </p:cNvPr>
+          <p:cNvCxnSpPr>
+            <a:cxnSpLocks/>
+            <a:stCxn id="106" idx="3"/>
+            <a:endCxn id="54" idx="1"/>
+          </p:cNvCxnSpPr>
+          <p:nvPr/>
+        </p:nvCxnSpPr>
+        <p:spPr>
+          <a:xfrm flipV="1">
+            <a:off x="4805273" y="4172235"/>
+            <a:ext cx="760103" cy="950"/>
+          </a:xfrm>
+          <a:prstGeom prst="curvedConnector3">
+            <a:avLst>
+              <a:gd name="adj1" fmla="val 50000"/>
+            </a:avLst>
+          </a:prstGeom>
+          <a:ln>
+            <a:tailEnd type="triangle"/>
+          </a:ln>
+        </p:spPr>
+        <p:style>
+          <a:lnRef idx="1">
+            <a:schemeClr val="accent1"/>
+          </a:lnRef>
+          <a:fillRef idx="0">
+            <a:schemeClr val="accent1"/>
+          </a:fillRef>
+          <a:effectRef idx="0">
+            <a:schemeClr val="accent1"/>
+          </a:effectRef>
+          <a:fontRef idx="minor">
+            <a:schemeClr val="tx1"/>
+          </a:fontRef>
+        </p:style>
+      </p:cxnSp>
+      <p:sp>
+        <p:nvSpPr>
+          <p:cNvPr id="7" name="TextBox 6">
+            <a:extLst>
+              <a:ext uri="{FF2B5EF4-FFF2-40B4-BE49-F238E27FC236}">
+                <a16:creationId xmlns:a16="http://schemas.microsoft.com/office/drawing/2014/main" id="{ABA2A3C7-98BA-4A07-A539-D75B99C54089}"/>
+              </a:ext>
+            </a:extLst>
+          </p:cNvPr>
+          <p:cNvSpPr txBox="1"/>
+          <p:nvPr/>
+        </p:nvSpPr>
+        <p:spPr>
+          <a:xfrm>
+            <a:off x="4571460" y="1902282"/>
+            <a:ext cx="268022" cy="261610"/>
+          </a:xfrm>
+          <a:prstGeom prst="rect">
+            <a:avLst/>
+          </a:prstGeom>
+          <a:noFill/>
+        </p:spPr>
+        <p:txBody>
+          <a:bodyPr wrap="none" rtlCol="0">
+            <a:spAutoFit/>
+          </a:bodyPr>
+          <a:lstStyle/>
+          <a:p>
+            <a:r>
+              <a:rPr lang="en-GB" sz="1050" dirty="0">
+                <a:latin typeface="Segoe UI" panose="020B0502040204020203" pitchFamily="34" charset="0"/>
+                <a:cs typeface="Segoe UI" panose="020B0502040204020203" pitchFamily="34" charset="0"/>
+              </a:rPr>
+              <a:t>X</a:t>
+            </a:r>
+          </a:p>
+        </p:txBody>
+      </p:sp>
+      <p:sp>
+        <p:nvSpPr>
+          <p:cNvPr id="76" name="TextBox 75">
+            <a:extLst>
+              <a:ext uri="{FF2B5EF4-FFF2-40B4-BE49-F238E27FC236}">
+                <a16:creationId xmlns:a16="http://schemas.microsoft.com/office/drawing/2014/main" id="{4AB13FE4-855A-4831-8034-96BB2F7A7618}"/>
+              </a:ext>
+            </a:extLst>
+          </p:cNvPr>
+          <p:cNvSpPr txBox="1"/>
+          <p:nvPr/>
+        </p:nvSpPr>
+        <p:spPr>
+          <a:xfrm>
+            <a:off x="4657921" y="5055192"/>
+            <a:ext cx="268022" cy="261610"/>
+          </a:xfrm>
+          <a:prstGeom prst="rect">
+            <a:avLst/>
+          </a:prstGeom>
+          <a:noFill/>
+        </p:spPr>
+        <p:txBody>
+          <a:bodyPr wrap="none" rtlCol="0">
+            <a:spAutoFit/>
+          </a:bodyPr>
+          <a:lstStyle/>
+          <a:p>
+            <a:r>
+              <a:rPr lang="en-GB" sz="1050" dirty="0">
+                <a:latin typeface="Segoe UI" panose="020B0502040204020203" pitchFamily="34" charset="0"/>
+                <a:cs typeface="Segoe UI" panose="020B0502040204020203" pitchFamily="34" charset="0"/>
+              </a:rPr>
+              <a:t>X</a:t>
+            </a:r>
+          </a:p>
+        </p:txBody>
+      </p:sp>
+      <p:sp>
+        <p:nvSpPr>
+          <p:cNvPr id="77" name="TextBox 76">
+            <a:extLst>
+              <a:ext uri="{FF2B5EF4-FFF2-40B4-BE49-F238E27FC236}">
+                <a16:creationId xmlns:a16="http://schemas.microsoft.com/office/drawing/2014/main" id="{71CBE2D3-4A1F-482C-ABA1-9393E703E3EC}"/>
+              </a:ext>
+            </a:extLst>
+          </p:cNvPr>
+          <p:cNvSpPr txBox="1"/>
+          <p:nvPr/>
+        </p:nvSpPr>
+        <p:spPr>
+          <a:xfrm>
+            <a:off x="4521448" y="2868162"/>
+            <a:ext cx="268022" cy="261610"/>
+          </a:xfrm>
+          <a:prstGeom prst="rect">
+            <a:avLst/>
+          </a:prstGeom>
+          <a:noFill/>
+        </p:spPr>
+        <p:txBody>
+          <a:bodyPr wrap="none" rtlCol="0">
+            <a:spAutoFit/>
+          </a:bodyPr>
+          <a:lstStyle/>
+          <a:p>
+            <a:r>
+              <a:rPr lang="en-GB" sz="1050" dirty="0">
+                <a:latin typeface="Segoe UI" panose="020B0502040204020203" pitchFamily="34" charset="0"/>
+                <a:cs typeface="Segoe UI" panose="020B0502040204020203" pitchFamily="34" charset="0"/>
+              </a:rPr>
+              <a:t>X</a:t>
+            </a:r>
+          </a:p>
+        </p:txBody>
+      </p:sp>
+      <p:sp>
+        <p:nvSpPr>
+          <p:cNvPr id="78" name="TextBox 77">
+            <a:extLst>
+              <a:ext uri="{FF2B5EF4-FFF2-40B4-BE49-F238E27FC236}">
+                <a16:creationId xmlns:a16="http://schemas.microsoft.com/office/drawing/2014/main" id="{73C82798-BC34-4164-B9F8-0D3A5B101BD7}"/>
+              </a:ext>
+            </a:extLst>
+          </p:cNvPr>
+          <p:cNvSpPr txBox="1"/>
+          <p:nvPr/>
+        </p:nvSpPr>
+        <p:spPr>
+          <a:xfrm>
+            <a:off x="4521448" y="3171149"/>
+            <a:ext cx="271228" cy="253916"/>
+          </a:xfrm>
+          <a:prstGeom prst="rect">
+            <a:avLst/>
+          </a:prstGeom>
+          <a:noFill/>
+        </p:spPr>
+        <p:txBody>
+          <a:bodyPr wrap="none" rtlCol="0">
+            <a:spAutoFit/>
+          </a:bodyPr>
+          <a:lstStyle/>
+          <a:p>
+            <a:r>
+              <a:rPr lang="en-GB" sz="1050" dirty="0">
+                <a:latin typeface="Segoe UI" panose="020B0502040204020203" pitchFamily="34" charset="0"/>
+                <a:cs typeface="Segoe UI" panose="020B0502040204020203" pitchFamily="34" charset="0"/>
+              </a:rPr>
+              <a:t>A</a:t>
+            </a:r>
+          </a:p>
+        </p:txBody>
+      </p:sp>
+      <p:sp>
+        <p:nvSpPr>
+          <p:cNvPr id="79" name="TextBox 78">
+            <a:extLst>
+              <a:ext uri="{FF2B5EF4-FFF2-40B4-BE49-F238E27FC236}">
+                <a16:creationId xmlns:a16="http://schemas.microsoft.com/office/drawing/2014/main" id="{311CA6A4-6628-4E13-8305-2003E93556B9}"/>
+              </a:ext>
+            </a:extLst>
+          </p:cNvPr>
+          <p:cNvSpPr txBox="1"/>
+          <p:nvPr/>
+        </p:nvSpPr>
+        <p:spPr>
+          <a:xfrm>
+            <a:off x="5887944" y="3146550"/>
+            <a:ext cx="271228" cy="253916"/>
+          </a:xfrm>
+          <a:prstGeom prst="rect">
+            <a:avLst/>
+          </a:prstGeom>
+          <a:noFill/>
+        </p:spPr>
+        <p:txBody>
+          <a:bodyPr wrap="none" rtlCol="0">
+            <a:spAutoFit/>
+          </a:bodyPr>
+          <a:lstStyle/>
+          <a:p>
+            <a:r>
+              <a:rPr lang="en-GB" sz="1050" dirty="0">
+                <a:latin typeface="Segoe UI" panose="020B0502040204020203" pitchFamily="34" charset="0"/>
+                <a:cs typeface="Segoe UI" panose="020B0502040204020203" pitchFamily="34" charset="0"/>
+              </a:rPr>
+              <a:t>A</a:t>
+            </a:r>
+          </a:p>
+        </p:txBody>
+      </p:sp>
+      <p:sp>
+        <p:nvSpPr>
+          <p:cNvPr id="80" name="TextBox 79">
+            <a:extLst>
+              <a:ext uri="{FF2B5EF4-FFF2-40B4-BE49-F238E27FC236}">
+                <a16:creationId xmlns:a16="http://schemas.microsoft.com/office/drawing/2014/main" id="{CB9FA438-9957-4DDC-A68C-2DC4B3D2894D}"/>
+              </a:ext>
+            </a:extLst>
+          </p:cNvPr>
+          <p:cNvSpPr txBox="1"/>
+          <p:nvPr/>
+        </p:nvSpPr>
+        <p:spPr>
+          <a:xfrm>
+            <a:off x="5881913" y="2851686"/>
+            <a:ext cx="268022" cy="261610"/>
+          </a:xfrm>
+          <a:prstGeom prst="rect">
+            <a:avLst/>
+          </a:prstGeom>
+          <a:noFill/>
+        </p:spPr>
+        <p:txBody>
+          <a:bodyPr wrap="none" rtlCol="0">
+            <a:spAutoFit/>
+          </a:bodyPr>
+          <a:lstStyle/>
+          <a:p>
+            <a:r>
+              <a:rPr lang="en-GB" sz="1050" dirty="0">
+                <a:latin typeface="Segoe UI" panose="020B0502040204020203" pitchFamily="34" charset="0"/>
+                <a:cs typeface="Segoe UI" panose="020B0502040204020203" pitchFamily="34" charset="0"/>
+              </a:rPr>
+              <a:t>X</a:t>
+            </a:r>
+          </a:p>
+        </p:txBody>
+      </p:sp>
+      <p:sp>
+        <p:nvSpPr>
+          <p:cNvPr id="81" name="TextBox 80">
+            <a:extLst>
+              <a:ext uri="{FF2B5EF4-FFF2-40B4-BE49-F238E27FC236}">
+                <a16:creationId xmlns:a16="http://schemas.microsoft.com/office/drawing/2014/main" id="{CA174133-5F4D-4F09-8D5B-C0EB8670187A}"/>
+              </a:ext>
+            </a:extLst>
+          </p:cNvPr>
+          <p:cNvSpPr txBox="1"/>
+          <p:nvPr/>
+        </p:nvSpPr>
+        <p:spPr>
+          <a:xfrm>
+            <a:off x="4515462" y="3893119"/>
+            <a:ext cx="268022" cy="261610"/>
+          </a:xfrm>
+          <a:prstGeom prst="rect">
+            <a:avLst/>
+          </a:prstGeom>
+          <a:noFill/>
+        </p:spPr>
+        <p:txBody>
+          <a:bodyPr wrap="none" rtlCol="0">
+            <a:spAutoFit/>
+          </a:bodyPr>
+          <a:lstStyle/>
+          <a:p>
+            <a:r>
+              <a:rPr lang="en-GB" sz="1050" dirty="0">
+                <a:latin typeface="Segoe UI" panose="020B0502040204020203" pitchFamily="34" charset="0"/>
+                <a:cs typeface="Segoe UI" panose="020B0502040204020203" pitchFamily="34" charset="0"/>
+              </a:rPr>
+              <a:t>X</a:t>
+            </a:r>
+          </a:p>
+        </p:txBody>
+      </p:sp>
+      <p:sp>
+        <p:nvSpPr>
+          <p:cNvPr id="82" name="TextBox 81">
+            <a:extLst>
+              <a:ext uri="{FF2B5EF4-FFF2-40B4-BE49-F238E27FC236}">
+                <a16:creationId xmlns:a16="http://schemas.microsoft.com/office/drawing/2014/main" id="{49468B9A-9948-436A-AA90-5F5224A14F77}"/>
+              </a:ext>
+            </a:extLst>
+          </p:cNvPr>
+          <p:cNvSpPr txBox="1"/>
+          <p:nvPr/>
+        </p:nvSpPr>
+        <p:spPr>
+          <a:xfrm>
+            <a:off x="4515462" y="4196106"/>
+            <a:ext cx="271228" cy="253916"/>
+          </a:xfrm>
+          <a:prstGeom prst="rect">
+            <a:avLst/>
+          </a:prstGeom>
+          <a:noFill/>
+        </p:spPr>
+        <p:txBody>
+          <a:bodyPr wrap="none" rtlCol="0">
+            <a:spAutoFit/>
+          </a:bodyPr>
+          <a:lstStyle/>
+          <a:p>
+            <a:r>
+              <a:rPr lang="en-GB" sz="1050" dirty="0">
+                <a:latin typeface="Segoe UI" panose="020B0502040204020203" pitchFamily="34" charset="0"/>
+                <a:cs typeface="Segoe UI" panose="020B0502040204020203" pitchFamily="34" charset="0"/>
+              </a:rPr>
+              <a:t>A</a:t>
+            </a:r>
+          </a:p>
+        </p:txBody>
+      </p:sp>
+      <p:sp>
+        <p:nvSpPr>
+          <p:cNvPr id="83" name="TextBox 82">
+            <a:extLst>
+              <a:ext uri="{FF2B5EF4-FFF2-40B4-BE49-F238E27FC236}">
+                <a16:creationId xmlns:a16="http://schemas.microsoft.com/office/drawing/2014/main" id="{50A1910B-9CFD-437B-80B7-9F28232040FA}"/>
+              </a:ext>
+            </a:extLst>
+          </p:cNvPr>
+          <p:cNvSpPr txBox="1"/>
+          <p:nvPr/>
+        </p:nvSpPr>
+        <p:spPr>
+          <a:xfrm>
+            <a:off x="5881958" y="4171507"/>
+            <a:ext cx="271228" cy="253916"/>
+          </a:xfrm>
+          <a:prstGeom prst="rect">
+            <a:avLst/>
+          </a:prstGeom>
+          <a:noFill/>
+        </p:spPr>
+        <p:txBody>
+          <a:bodyPr wrap="none" rtlCol="0">
+            <a:spAutoFit/>
+          </a:bodyPr>
+          <a:lstStyle/>
+          <a:p>
+            <a:r>
+              <a:rPr lang="en-GB" sz="1050" dirty="0">
+                <a:latin typeface="Segoe UI" panose="020B0502040204020203" pitchFamily="34" charset="0"/>
+                <a:cs typeface="Segoe UI" panose="020B0502040204020203" pitchFamily="34" charset="0"/>
+              </a:rPr>
+              <a:t>A</a:t>
+            </a:r>
+          </a:p>
+        </p:txBody>
+      </p:sp>
+      <p:sp>
+        <p:nvSpPr>
+          <p:cNvPr id="84" name="TextBox 83">
+            <a:extLst>
+              <a:ext uri="{FF2B5EF4-FFF2-40B4-BE49-F238E27FC236}">
+                <a16:creationId xmlns:a16="http://schemas.microsoft.com/office/drawing/2014/main" id="{EBA8999D-7EF2-447C-9F41-E817E05936B2}"/>
+              </a:ext>
+            </a:extLst>
+          </p:cNvPr>
+          <p:cNvSpPr txBox="1"/>
+          <p:nvPr/>
+        </p:nvSpPr>
+        <p:spPr>
+          <a:xfrm>
+            <a:off x="5867950" y="3905700"/>
+            <a:ext cx="268022" cy="261610"/>
+          </a:xfrm>
+          <a:prstGeom prst="rect">
+            <a:avLst/>
+          </a:prstGeom>
+          <a:noFill/>
+        </p:spPr>
+        <p:txBody>
+          <a:bodyPr wrap="none" rtlCol="0">
+            <a:spAutoFit/>
+          </a:bodyPr>
+          <a:lstStyle/>
+          <a:p>
+            <a:r>
+              <a:rPr lang="en-GB" sz="1050" dirty="0">
+                <a:latin typeface="Segoe UI" panose="020B0502040204020203" pitchFamily="34" charset="0"/>
+                <a:cs typeface="Segoe UI" panose="020B0502040204020203" pitchFamily="34" charset="0"/>
+              </a:rPr>
+              <a:t>X</a:t>
+            </a:r>
+          </a:p>
+        </p:txBody>
+      </p:sp>
+      <p:grpSp>
+        <p:nvGrpSpPr>
+          <p:cNvPr id="85" name="Group 84">
+            <a:extLst>
+              <a:ext uri="{FF2B5EF4-FFF2-40B4-BE49-F238E27FC236}">
+                <a16:creationId xmlns:a16="http://schemas.microsoft.com/office/drawing/2014/main" id="{C29BBCC1-44FF-44DE-95EC-AB7B9312922C}"/>
+              </a:ext>
+            </a:extLst>
+          </p:cNvPr>
+          <p:cNvGrpSpPr/>
+          <p:nvPr/>
+        </p:nvGrpSpPr>
+        <p:grpSpPr>
+          <a:xfrm>
+            <a:off x="5563264" y="4950724"/>
+            <a:ext cx="602474" cy="611588"/>
+            <a:chOff x="6306410" y="2220835"/>
+            <a:chExt cx="602474" cy="611588"/>
+          </a:xfrm>
+        </p:grpSpPr>
+        <p:sp>
+          <p:nvSpPr>
+            <p:cNvPr id="86" name="Rectangle 85">
+              <a:extLst>
+                <a:ext uri="{FF2B5EF4-FFF2-40B4-BE49-F238E27FC236}">
+                  <a16:creationId xmlns:a16="http://schemas.microsoft.com/office/drawing/2014/main" id="{25766DDB-DDF5-4FC3-ABB9-8C881B3C9B9A}"/>
+                </a:ext>
+              </a:extLst>
+            </p:cNvPr>
+            <p:cNvSpPr/>
+            <p:nvPr/>
+          </p:nvSpPr>
+          <p:spPr>
+            <a:xfrm>
+              <a:off x="6306410" y="2220835"/>
+              <a:ext cx="602474" cy="611588"/>
+            </a:xfrm>
+            <a:prstGeom prst="rect">
+              <a:avLst/>
+            </a:prstGeom>
+            <a:effectLst>
+              <a:innerShdw blurRad="63500" dist="50800" dir="8100000">
+                <a:prstClr val="black">
+                  <a:alpha val="50000"/>
+                </a:prstClr>
+              </a:innerShdw>
+            </a:effectLst>
+          </p:spPr>
+          <p:style>
+            <a:lnRef idx="2">
+              <a:schemeClr val="accent1"/>
+            </a:lnRef>
+            <a:fillRef idx="1">
+              <a:schemeClr val="lt1"/>
+            </a:fillRef>
+            <a:effectRef idx="0">
+              <a:schemeClr val="accent1"/>
+            </a:effectRef>
+            <a:fontRef idx="minor">
+              <a:schemeClr val="dk1"/>
+            </a:fontRef>
+          </p:style>
+          <p:txBody>
+            <a:bodyPr rot="0" spcFirstLastPara="0" vertOverflow="overflow" horzOverflow="overflow" vert="horz" wrap="square" lIns="91440" tIns="45720" rIns="91440" bIns="45720" numCol="1" spcCol="0" rtlCol="0" fromWordArt="0" anchor="ctr" anchorCtr="0" forceAA="0" compatLnSpc="1">
+              <a:prstTxWarp prst="textNoShape">
+                <a:avLst/>
+              </a:prstTxWarp>
+              <a:noAutofit/>
+            </a:bodyPr>
+            <a:lstStyle/>
+            <a:p>
+              <a:pPr algn="ctr"/>
+              <a:endParaRPr lang="en-GB" dirty="0">
+                <a:solidFill>
+                  <a:schemeClr val="dk1"/>
+                </a:solidFill>
+              </a:endParaRPr>
+            </a:p>
+          </p:txBody>
+        </p:sp>
+        <p:cxnSp>
+          <p:nvCxnSpPr>
+            <p:cNvPr id="87" name="Straight Connector 86">
+              <a:extLst>
+                <a:ext uri="{FF2B5EF4-FFF2-40B4-BE49-F238E27FC236}">
+                  <a16:creationId xmlns:a16="http://schemas.microsoft.com/office/drawing/2014/main" id="{A2DB15DE-3CF6-40A4-B56A-E17D1034B0D6}"/>
+                </a:ext>
+              </a:extLst>
+            </p:cNvPr>
+            <p:cNvCxnSpPr>
+              <a:cxnSpLocks/>
+              <a:stCxn id="86" idx="0"/>
+              <a:endCxn id="86" idx="2"/>
+            </p:cNvCxnSpPr>
+            <p:nvPr/>
+          </p:nvCxnSpPr>
+          <p:spPr>
+            <a:xfrm>
+              <a:off x="6607647" y="2220835"/>
+              <a:ext cx="0" cy="611588"/>
+            </a:xfrm>
+            <a:prstGeom prst="line">
+              <a:avLst/>
+            </a:prstGeom>
+            <a:ln>
+              <a:solidFill>
+                <a:schemeClr val="bg2">
+                  <a:lumMod val="90000"/>
+                </a:schemeClr>
+              </a:solidFill>
+            </a:ln>
+          </p:spPr>
+          <p:style>
+            <a:lnRef idx="1">
+              <a:schemeClr val="accent1"/>
+            </a:lnRef>
+            <a:fillRef idx="0">
+              <a:schemeClr val="accent1"/>
+            </a:fillRef>
+            <a:effectRef idx="0">
+              <a:schemeClr val="accent1"/>
+            </a:effectRef>
+            <a:fontRef idx="minor">
+              <a:schemeClr val="tx1"/>
+            </a:fontRef>
+          </p:style>
+        </p:cxnSp>
+        <p:cxnSp>
+          <p:nvCxnSpPr>
+            <p:cNvPr id="88" name="Straight Connector 87">
+              <a:extLst>
+                <a:ext uri="{FF2B5EF4-FFF2-40B4-BE49-F238E27FC236}">
+                  <a16:creationId xmlns:a16="http://schemas.microsoft.com/office/drawing/2014/main" id="{27675F9A-4483-405E-A6D6-9C1E1797A908}"/>
+                </a:ext>
+              </a:extLst>
+            </p:cNvPr>
+            <p:cNvCxnSpPr>
+              <a:cxnSpLocks/>
+              <a:stCxn id="86" idx="1"/>
+              <a:endCxn id="86" idx="3"/>
+            </p:cNvCxnSpPr>
+            <p:nvPr/>
+          </p:nvCxnSpPr>
+          <p:spPr>
+            <a:xfrm>
+              <a:off x="6306410" y="2526629"/>
+              <a:ext cx="602474" cy="0"/>
+            </a:xfrm>
+            <a:prstGeom prst="line">
+              <a:avLst/>
+            </a:prstGeom>
+            <a:ln>
+              <a:solidFill>
+                <a:schemeClr val="bg2">
+                  <a:lumMod val="90000"/>
+                </a:schemeClr>
+              </a:solidFill>
+            </a:ln>
+          </p:spPr>
+          <p:style>
+            <a:lnRef idx="1">
+              <a:schemeClr val="accent1"/>
+            </a:lnRef>
+            <a:fillRef idx="0">
+              <a:schemeClr val="accent1"/>
+            </a:fillRef>
+            <a:effectRef idx="0">
+              <a:schemeClr val="accent1"/>
+            </a:effectRef>
+            <a:fontRef idx="minor">
+              <a:schemeClr val="tx1"/>
+            </a:fontRef>
+          </p:style>
+        </p:cxnSp>
+      </p:grpSp>
+      <p:sp>
+        <p:nvSpPr>
+          <p:cNvPr id="89" name="Oval 88">
+            <a:extLst>
+              <a:ext uri="{FF2B5EF4-FFF2-40B4-BE49-F238E27FC236}">
+                <a16:creationId xmlns:a16="http://schemas.microsoft.com/office/drawing/2014/main" id="{E6BA5D85-0265-475C-9684-9C7B22F8ED48}"/>
+              </a:ext>
+            </a:extLst>
+          </p:cNvPr>
+          <p:cNvSpPr/>
+          <p:nvPr/>
+        </p:nvSpPr>
+        <p:spPr>
+          <a:xfrm>
+            <a:off x="5955914" y="5052805"/>
+            <a:ext cx="101633" cy="101633"/>
+          </a:xfrm>
+          <a:prstGeom prst="ellipse">
+            <a:avLst/>
+          </a:prstGeom>
+        </p:spPr>
+        <p:style>
+          <a:lnRef idx="2">
+            <a:schemeClr val="accent1">
+              <a:shade val="50000"/>
+            </a:schemeClr>
+          </a:lnRef>
+          <a:fillRef idx="1">
+            <a:schemeClr val="accent1"/>
+          </a:fillRef>
+          <a:effectRef idx="0">
+            <a:schemeClr val="accent1"/>
+          </a:effectRef>
+          <a:fontRef idx="minor">
+            <a:schemeClr val="lt1"/>
+          </a:fontRef>
+        </p:style>
+        <p:txBody>
+          <a:bodyPr rtlCol="0" anchor="ctr"/>
+          <a:lstStyle/>
+          <a:p>
+            <a:pPr algn="ctr"/>
+            <a:endParaRPr lang="en-GB"/>
+          </a:p>
+        </p:txBody>
+      </p:sp>
+      <p:sp>
+        <p:nvSpPr>
+          <p:cNvPr id="97" name="Oval 96">
+            <a:extLst>
+              <a:ext uri="{FF2B5EF4-FFF2-40B4-BE49-F238E27FC236}">
+                <a16:creationId xmlns:a16="http://schemas.microsoft.com/office/drawing/2014/main" id="{68ED4C28-D9A7-4314-B8D2-4118169F0D17}"/>
+              </a:ext>
+            </a:extLst>
+          </p:cNvPr>
+          <p:cNvSpPr/>
+          <p:nvPr/>
+        </p:nvSpPr>
+        <p:spPr>
+          <a:xfrm>
+            <a:off x="5964303" y="5364452"/>
+            <a:ext cx="101633" cy="101633"/>
+          </a:xfrm>
+          <a:prstGeom prst="ellipse">
+            <a:avLst/>
+          </a:prstGeom>
+        </p:spPr>
+        <p:style>
+          <a:lnRef idx="2">
+            <a:schemeClr val="accent1">
+              <a:shade val="50000"/>
+            </a:schemeClr>
+          </a:lnRef>
+          <a:fillRef idx="1">
+            <a:schemeClr val="accent1"/>
+          </a:fillRef>
+          <a:effectRef idx="0">
+            <a:schemeClr val="accent1"/>
+          </a:effectRef>
+          <a:fontRef idx="minor">
+            <a:schemeClr val="lt1"/>
+          </a:fontRef>
+        </p:style>
+        <p:txBody>
+          <a:bodyPr rtlCol="0" anchor="ctr"/>
+          <a:lstStyle/>
+          <a:p>
+            <a:pPr algn="ctr"/>
+            <a:endParaRPr lang="en-GB"/>
+          </a:p>
+        </p:txBody>
+      </p:sp>
+      <p:cxnSp>
+        <p:nvCxnSpPr>
+          <p:cNvPr id="98" name="Connector: Elbow 121">
+            <a:extLst>
+              <a:ext uri="{FF2B5EF4-FFF2-40B4-BE49-F238E27FC236}">
+                <a16:creationId xmlns:a16="http://schemas.microsoft.com/office/drawing/2014/main" id="{1118D122-9115-4A0D-82E1-EF709535F1E3}"/>
+              </a:ext>
+            </a:extLst>
+          </p:cNvPr>
+          <p:cNvCxnSpPr>
+            <a:cxnSpLocks/>
+            <a:stCxn id="86" idx="3"/>
+            <a:endCxn id="122" idx="1"/>
+          </p:cNvCxnSpPr>
+          <p:nvPr/>
+        </p:nvCxnSpPr>
+        <p:spPr>
+          <a:xfrm flipV="1">
+            <a:off x="6165738" y="5251888"/>
+            <a:ext cx="750586" cy="4630"/>
+          </a:xfrm>
+          <a:prstGeom prst="curvedConnector3">
+            <a:avLst>
+              <a:gd name="adj1" fmla="val 50000"/>
+            </a:avLst>
+          </a:prstGeom>
+          <a:ln>
+            <a:tailEnd type="triangle"/>
+          </a:ln>
+        </p:spPr>
+        <p:style>
+          <a:lnRef idx="1">
+            <a:schemeClr val="accent1"/>
+          </a:lnRef>
+          <a:fillRef idx="0">
+            <a:schemeClr val="accent1"/>
+          </a:fillRef>
+          <a:effectRef idx="0">
+            <a:schemeClr val="accent1"/>
+          </a:effectRef>
+          <a:fontRef idx="minor">
+            <a:schemeClr val="tx1"/>
+          </a:fontRef>
+        </p:style>
+      </p:cxnSp>
+      <p:sp>
+        <p:nvSpPr>
+          <p:cNvPr id="99" name="TextBox 98">
+            <a:extLst>
+              <a:ext uri="{FF2B5EF4-FFF2-40B4-BE49-F238E27FC236}">
+                <a16:creationId xmlns:a16="http://schemas.microsoft.com/office/drawing/2014/main" id="{44D183F9-50EA-405F-B205-B765CC569927}"/>
+              </a:ext>
+            </a:extLst>
+          </p:cNvPr>
+          <p:cNvSpPr txBox="1"/>
+          <p:nvPr/>
+        </p:nvSpPr>
+        <p:spPr>
+          <a:xfrm>
+            <a:off x="5875927" y="4976452"/>
+            <a:ext cx="268022" cy="261610"/>
+          </a:xfrm>
+          <a:prstGeom prst="rect">
+            <a:avLst/>
+          </a:prstGeom>
+          <a:noFill/>
+        </p:spPr>
+        <p:txBody>
+          <a:bodyPr wrap="none" rtlCol="0">
+            <a:spAutoFit/>
+          </a:bodyPr>
+          <a:lstStyle/>
+          <a:p>
+            <a:r>
+              <a:rPr lang="en-GB" sz="1050" dirty="0">
+                <a:latin typeface="Segoe UI" panose="020B0502040204020203" pitchFamily="34" charset="0"/>
+                <a:cs typeface="Segoe UI" panose="020B0502040204020203" pitchFamily="34" charset="0"/>
+              </a:rPr>
+              <a:t>X</a:t>
+            </a:r>
+          </a:p>
+        </p:txBody>
+      </p:sp>
+      <p:sp>
+        <p:nvSpPr>
+          <p:cNvPr id="100" name="TextBox 99">
+            <a:extLst>
+              <a:ext uri="{FF2B5EF4-FFF2-40B4-BE49-F238E27FC236}">
+                <a16:creationId xmlns:a16="http://schemas.microsoft.com/office/drawing/2014/main" id="{628E6845-0903-4583-ADEF-CAC8BD7917D6}"/>
+              </a:ext>
+            </a:extLst>
+          </p:cNvPr>
+          <p:cNvSpPr txBox="1"/>
+          <p:nvPr/>
+        </p:nvSpPr>
+        <p:spPr>
+          <a:xfrm>
+            <a:off x="5875927" y="5279439"/>
+            <a:ext cx="271228" cy="253916"/>
+          </a:xfrm>
+          <a:prstGeom prst="rect">
+            <a:avLst/>
+          </a:prstGeom>
+          <a:noFill/>
+        </p:spPr>
+        <p:txBody>
+          <a:bodyPr wrap="none" rtlCol="0">
+            <a:spAutoFit/>
+          </a:bodyPr>
+          <a:lstStyle/>
+          <a:p>
+            <a:r>
+              <a:rPr lang="en-GB" sz="1050" dirty="0">
+                <a:latin typeface="Segoe UI" panose="020B0502040204020203" pitchFamily="34" charset="0"/>
+                <a:cs typeface="Segoe UI" panose="020B0502040204020203" pitchFamily="34" charset="0"/>
+              </a:rPr>
+              <a:t>A</a:t>
+            </a:r>
+          </a:p>
+        </p:txBody>
+      </p:sp>
+      <p:grpSp>
+        <p:nvGrpSpPr>
+          <p:cNvPr id="110" name="Group 109">
+            <a:extLst>
+              <a:ext uri="{FF2B5EF4-FFF2-40B4-BE49-F238E27FC236}">
+                <a16:creationId xmlns:a16="http://schemas.microsoft.com/office/drawing/2014/main" id="{AFCB8017-5F99-4D13-A277-0DF2BDF8B901}"/>
+              </a:ext>
+            </a:extLst>
+          </p:cNvPr>
+          <p:cNvGrpSpPr/>
+          <p:nvPr/>
+        </p:nvGrpSpPr>
+        <p:grpSpPr>
+          <a:xfrm>
+            <a:off x="6916324" y="4946094"/>
+            <a:ext cx="602474" cy="611588"/>
+            <a:chOff x="6306410" y="2220835"/>
+            <a:chExt cx="602474" cy="611588"/>
+          </a:xfrm>
+        </p:grpSpPr>
+        <p:sp>
+          <p:nvSpPr>
+            <p:cNvPr id="122" name="Rectangle 121">
+              <a:extLst>
+                <a:ext uri="{FF2B5EF4-FFF2-40B4-BE49-F238E27FC236}">
+                  <a16:creationId xmlns:a16="http://schemas.microsoft.com/office/drawing/2014/main" id="{44EFB4D7-D493-4AA4-B4EB-603D2E0C0CFE}"/>
+                </a:ext>
+              </a:extLst>
+            </p:cNvPr>
+            <p:cNvSpPr/>
+            <p:nvPr/>
+          </p:nvSpPr>
+          <p:spPr>
+            <a:xfrm>
+              <a:off x="6306410" y="2220835"/>
+              <a:ext cx="602474" cy="611588"/>
+            </a:xfrm>
+            <a:prstGeom prst="rect">
+              <a:avLst/>
+            </a:prstGeom>
+            <a:effectLst>
+              <a:innerShdw blurRad="63500" dist="50800" dir="8100000">
+                <a:prstClr val="black">
+                  <a:alpha val="50000"/>
+                </a:prstClr>
+              </a:innerShdw>
+            </a:effectLst>
+          </p:spPr>
+          <p:style>
+            <a:lnRef idx="2">
+              <a:schemeClr val="accent1"/>
+            </a:lnRef>
+            <a:fillRef idx="1">
+              <a:schemeClr val="lt1"/>
+            </a:fillRef>
+            <a:effectRef idx="0">
+              <a:schemeClr val="accent1"/>
+            </a:effectRef>
+            <a:fontRef idx="minor">
+              <a:schemeClr val="dk1"/>
+            </a:fontRef>
+          </p:style>
+          <p:txBody>
+            <a:bodyPr rot="0" spcFirstLastPara="0" vertOverflow="overflow" horzOverflow="overflow" vert="horz" wrap="square" lIns="91440" tIns="45720" rIns="91440" bIns="45720" numCol="1" spcCol="0" rtlCol="0" fromWordArt="0" anchor="ctr" anchorCtr="0" forceAA="0" compatLnSpc="1">
+              <a:prstTxWarp prst="textNoShape">
+                <a:avLst/>
+              </a:prstTxWarp>
+              <a:noAutofit/>
+            </a:bodyPr>
+            <a:lstStyle/>
+            <a:p>
+              <a:pPr algn="ctr"/>
+              <a:endParaRPr lang="en-GB" dirty="0">
+                <a:solidFill>
+                  <a:schemeClr val="dk1"/>
+                </a:solidFill>
+              </a:endParaRPr>
+            </a:p>
+          </p:txBody>
+        </p:sp>
+        <p:cxnSp>
+          <p:nvCxnSpPr>
+            <p:cNvPr id="125" name="Straight Connector 124">
+              <a:extLst>
+                <a:ext uri="{FF2B5EF4-FFF2-40B4-BE49-F238E27FC236}">
+                  <a16:creationId xmlns:a16="http://schemas.microsoft.com/office/drawing/2014/main" id="{A5DE4015-94AF-4B96-9D57-E54F7A09B99F}"/>
+                </a:ext>
+              </a:extLst>
+            </p:cNvPr>
+            <p:cNvCxnSpPr>
+              <a:cxnSpLocks/>
+              <a:stCxn id="122" idx="0"/>
+              <a:endCxn id="122" idx="2"/>
+            </p:cNvCxnSpPr>
+            <p:nvPr/>
+          </p:nvCxnSpPr>
+          <p:spPr>
+            <a:xfrm>
+              <a:off x="6607647" y="2220835"/>
+              <a:ext cx="0" cy="611588"/>
+            </a:xfrm>
+            <a:prstGeom prst="line">
+              <a:avLst/>
+            </a:prstGeom>
+            <a:ln>
+              <a:solidFill>
+                <a:schemeClr val="bg2">
+                  <a:lumMod val="90000"/>
+                </a:schemeClr>
+              </a:solidFill>
+            </a:ln>
+          </p:spPr>
+          <p:style>
+            <a:lnRef idx="1">
+              <a:schemeClr val="accent1"/>
+            </a:lnRef>
+            <a:fillRef idx="0">
+              <a:schemeClr val="accent1"/>
+            </a:fillRef>
+            <a:effectRef idx="0">
+              <a:schemeClr val="accent1"/>
+            </a:effectRef>
+            <a:fontRef idx="minor">
+              <a:schemeClr val="tx1"/>
+            </a:fontRef>
+          </p:style>
+        </p:cxnSp>
+        <p:cxnSp>
+          <p:nvCxnSpPr>
+            <p:cNvPr id="128" name="Straight Connector 127">
+              <a:extLst>
+                <a:ext uri="{FF2B5EF4-FFF2-40B4-BE49-F238E27FC236}">
+                  <a16:creationId xmlns:a16="http://schemas.microsoft.com/office/drawing/2014/main" id="{438EC880-2AF9-4D1C-8E5E-4312D35838FA}"/>
+                </a:ext>
+              </a:extLst>
+            </p:cNvPr>
+            <p:cNvCxnSpPr>
+              <a:cxnSpLocks/>
+              <a:stCxn id="122" idx="1"/>
+              <a:endCxn id="122" idx="3"/>
+            </p:cNvCxnSpPr>
+            <p:nvPr/>
+          </p:nvCxnSpPr>
+          <p:spPr>
+            <a:xfrm>
+              <a:off x="6306410" y="2526629"/>
+              <a:ext cx="602474" cy="0"/>
+            </a:xfrm>
+            <a:prstGeom prst="line">
+              <a:avLst/>
+            </a:prstGeom>
+            <a:ln>
+              <a:solidFill>
+                <a:schemeClr val="bg2">
+                  <a:lumMod val="90000"/>
+                </a:schemeClr>
+              </a:solidFill>
+            </a:ln>
+          </p:spPr>
+          <p:style>
+            <a:lnRef idx="1">
+              <a:schemeClr val="accent1"/>
+            </a:lnRef>
+            <a:fillRef idx="0">
+              <a:schemeClr val="accent1"/>
+            </a:fillRef>
+            <a:effectRef idx="0">
+              <a:schemeClr val="accent1"/>
+            </a:effectRef>
+            <a:fontRef idx="minor">
+              <a:schemeClr val="tx1"/>
+            </a:fontRef>
+          </p:style>
+        </p:cxnSp>
+      </p:grpSp>
+      <p:sp>
+        <p:nvSpPr>
+          <p:cNvPr id="131" name="Oval 130">
+            <a:extLst>
+              <a:ext uri="{FF2B5EF4-FFF2-40B4-BE49-F238E27FC236}">
+                <a16:creationId xmlns:a16="http://schemas.microsoft.com/office/drawing/2014/main" id="{CF1626BA-0D2D-4443-B25C-7F28871E15B7}"/>
+              </a:ext>
+            </a:extLst>
+          </p:cNvPr>
+          <p:cNvSpPr/>
+          <p:nvPr/>
+        </p:nvSpPr>
+        <p:spPr>
+          <a:xfrm>
+            <a:off x="7315300" y="5325203"/>
+            <a:ext cx="101633" cy="101633"/>
+          </a:xfrm>
+          <a:prstGeom prst="ellipse">
+            <a:avLst/>
+          </a:prstGeom>
+        </p:spPr>
+        <p:style>
+          <a:lnRef idx="2">
+            <a:schemeClr val="accent1">
+              <a:shade val="50000"/>
+            </a:schemeClr>
+          </a:lnRef>
+          <a:fillRef idx="1">
+            <a:schemeClr val="accent1"/>
+          </a:fillRef>
+          <a:effectRef idx="0">
+            <a:schemeClr val="accent1"/>
+          </a:effectRef>
+          <a:fontRef idx="minor">
+            <a:schemeClr val="lt1"/>
+          </a:fontRef>
+        </p:style>
+        <p:txBody>
+          <a:bodyPr rtlCol="0" anchor="ctr"/>
+          <a:lstStyle/>
+          <a:p>
+            <a:pPr algn="ctr"/>
+            <a:endParaRPr lang="en-GB"/>
+          </a:p>
+        </p:txBody>
+      </p:sp>
+      <p:sp>
+        <p:nvSpPr>
+          <p:cNvPr id="138" name="TextBox 137">
+            <a:extLst>
+              <a:ext uri="{FF2B5EF4-FFF2-40B4-BE49-F238E27FC236}">
+                <a16:creationId xmlns:a16="http://schemas.microsoft.com/office/drawing/2014/main" id="{498E9696-9299-4E8A-9BB6-77420A94C71A}"/>
+              </a:ext>
+            </a:extLst>
+          </p:cNvPr>
+          <p:cNvSpPr txBox="1"/>
+          <p:nvPr/>
+        </p:nvSpPr>
+        <p:spPr>
+          <a:xfrm>
+            <a:off x="7232906" y="5251160"/>
+            <a:ext cx="271228" cy="253916"/>
+          </a:xfrm>
+          <a:prstGeom prst="rect">
+            <a:avLst/>
+          </a:prstGeom>
+          <a:noFill/>
+        </p:spPr>
+        <p:txBody>
+          <a:bodyPr wrap="none" rtlCol="0">
+            <a:spAutoFit/>
+          </a:bodyPr>
+          <a:lstStyle/>
+          <a:p>
+            <a:r>
+              <a:rPr lang="en-GB" sz="1050" dirty="0">
+                <a:latin typeface="Segoe UI" panose="020B0502040204020203" pitchFamily="34" charset="0"/>
+                <a:cs typeface="Segoe UI" panose="020B0502040204020203" pitchFamily="34" charset="0"/>
+              </a:rPr>
+              <a:t>A</a:t>
+            </a:r>
+          </a:p>
+        </p:txBody>
+      </p:sp>
+      <p:sp>
+        <p:nvSpPr>
+          <p:cNvPr id="146" name="TextBox 145">
+            <a:extLst>
+              <a:ext uri="{FF2B5EF4-FFF2-40B4-BE49-F238E27FC236}">
+                <a16:creationId xmlns:a16="http://schemas.microsoft.com/office/drawing/2014/main" id="{0E5D50C7-2FC7-4320-BBC5-5863E19967DE}"/>
+              </a:ext>
+            </a:extLst>
+          </p:cNvPr>
+          <p:cNvSpPr txBox="1"/>
+          <p:nvPr/>
+        </p:nvSpPr>
+        <p:spPr>
+          <a:xfrm>
+            <a:off x="7218898" y="4985353"/>
+            <a:ext cx="268022" cy="261610"/>
+          </a:xfrm>
+          <a:prstGeom prst="rect">
+            <a:avLst/>
+          </a:prstGeom>
+          <a:noFill/>
+        </p:spPr>
+        <p:txBody>
+          <a:bodyPr wrap="none" rtlCol="0">
+            <a:spAutoFit/>
+          </a:bodyPr>
+          <a:lstStyle/>
+          <a:p>
+            <a:r>
+              <a:rPr lang="en-GB" sz="1050" dirty="0">
+                <a:latin typeface="Segoe UI" panose="020B0502040204020203" pitchFamily="34" charset="0"/>
+                <a:cs typeface="Segoe UI" panose="020B0502040204020203" pitchFamily="34" charset="0"/>
+              </a:rPr>
+              <a:t>X</a:t>
+            </a:r>
+          </a:p>
+        </p:txBody>
+      </p:sp>
+    </p:spTree>
+    <p:extLst>
+      <p:ext uri="{BB962C8B-B14F-4D97-AF65-F5344CB8AC3E}">
+        <p14:creationId xmlns:p14="http://schemas.microsoft.com/office/powerpoint/2010/main" val="2993272372"/>
       </p:ext>
     </p:extLst>
   </p:cSld>
@@ -12520,18 +16036,18 @@
 </file>
 
 <file path=customXml/item2.xml><?xml version="1.0" encoding="utf-8"?>
+<p:properties xmlns:p="http://schemas.microsoft.com/office/2006/metadata/properties" xmlns:xsi="http://www.w3.org/2001/XMLSchema-instance" xmlns:pc="http://schemas.microsoft.com/office/infopath/2007/PartnerControls">
+  <documentManagement/>
+</p:properties>
+</file>
+
+<file path=customXml/item3.xml><?xml version="1.0" encoding="utf-8"?>
 <?mso-contentType ?>
 <FormTemplates xmlns="http://schemas.microsoft.com/sharepoint/v3/contenttype/forms">
   <Display>DocumentLibraryForm</Display>
   <Edit>DocumentLibraryForm</Edit>
   <New>DocumentLibraryForm</New>
 </FormTemplates>
-</file>
-
-<file path=customXml/item3.xml><?xml version="1.0" encoding="utf-8"?>
-<p:properties xmlns:p="http://schemas.microsoft.com/office/2006/metadata/properties" xmlns:xsi="http://www.w3.org/2001/XMLSchema-instance" xmlns:pc="http://schemas.microsoft.com/office/infopath/2007/PartnerControls">
-  <documentManagement/>
-</p:properties>
 </file>
 
 <file path=customXml/itemProps1.xml><?xml version="1.0" encoding="utf-8"?>
@@ -12554,26 +16070,26 @@
 </file>
 
 <file path=customXml/itemProps2.xml><?xml version="1.0" encoding="utf-8"?>
+<ds:datastoreItem xmlns:ds="http://schemas.openxmlformats.org/officeDocument/2006/customXml" ds:itemID="{EFBD9E83-AD15-4F2F-B1C1-50B0C1A1F1CC}">
+  <ds:schemaRefs>
+    <ds:schemaRef ds:uri="http://schemas.microsoft.com/office/2006/metadata/properties"/>
+    <ds:schemaRef ds:uri="http://schemas.microsoft.com/office/2006/documentManagement/types"/>
+    <ds:schemaRef ds:uri="http://www.w3.org/XML/1998/namespace"/>
+    <ds:schemaRef ds:uri="http://purl.org/dc/elements/1.1/"/>
+    <ds:schemaRef ds:uri="68180f77-a1a7-47fb-965a-e6d58d491d71"/>
+    <ds:schemaRef ds:uri="http://schemas.microsoft.com/office/infopath/2007/PartnerControls"/>
+    <ds:schemaRef ds:uri="http://purl.org/dc/terms/"/>
+    <ds:schemaRef ds:uri="http://schemas.openxmlformats.org/package/2006/metadata/core-properties"/>
+    <ds:schemaRef ds:uri="296a1fc6-7678-4e70-8264-551cd3672944"/>
+    <ds:schemaRef ds:uri="http://purl.org/dc/dcmitype/"/>
+  </ds:schemaRefs>
+</ds:datastoreItem>
+</file>
+
+<file path=customXml/itemProps3.xml><?xml version="1.0" encoding="utf-8"?>
 <ds:datastoreItem xmlns:ds="http://schemas.openxmlformats.org/officeDocument/2006/customXml" ds:itemID="{1A1F03D5-511F-483E-BE1D-5CCFA9EFC02D}">
   <ds:schemaRefs>
     <ds:schemaRef ds:uri="http://schemas.microsoft.com/sharepoint/v3/contenttype/forms"/>
   </ds:schemaRefs>
 </ds:datastoreItem>
-</file>
-
-<file path=customXml/itemProps3.xml><?xml version="1.0" encoding="utf-8"?>
-<ds:datastoreItem xmlns:ds="http://schemas.openxmlformats.org/officeDocument/2006/customXml" ds:itemID="{EFBD9E83-AD15-4F2F-B1C1-50B0C1A1F1CC}">
-  <ds:schemaRefs>
-    <ds:schemaRef ds:uri="http://schemas.microsoft.com/office/2006/documentManagement/types"/>
-    <ds:schemaRef ds:uri="http://purl.org/dc/elements/1.1/"/>
-    <ds:schemaRef ds:uri="http://www.w3.org/XML/1998/namespace"/>
-    <ds:schemaRef ds:uri="http://purl.org/dc/terms/"/>
-    <ds:schemaRef ds:uri="296a1fc6-7678-4e70-8264-551cd3672944"/>
-    <ds:schemaRef ds:uri="http://purl.org/dc/dcmitype/"/>
-    <ds:schemaRef ds:uri="http://schemas.microsoft.com/office/2006/metadata/properties"/>
-    <ds:schemaRef ds:uri="http://schemas.openxmlformats.org/package/2006/metadata/core-properties"/>
-    <ds:schemaRef ds:uri="http://schemas.microsoft.com/office/infopath/2007/PartnerControls"/>
-    <ds:schemaRef ds:uri="68180f77-a1a7-47fb-965a-e6d58d491d71"/>
-  </ds:schemaRefs>
-</ds:datastoreItem>
 </file>
</xml_diff>